<commit_message>
upload revised, edited and updated files
</commit_message>
<xml_diff>
--- a/flu_indicator/data/resources/Presentation1.pptx
+++ b/flu_indicator/data/resources/Presentation1.pptx
@@ -5,19 +5,11 @@
     <p:sldMasterId id="2147483739" r:id="rId1"/>
   </p:sldMasterIdLst>
   <p:sldIdLst>
-    <p:sldId id="256" r:id="rId2"/>
-    <p:sldId id="262" r:id="rId3"/>
-    <p:sldId id="264" r:id="rId4"/>
-    <p:sldId id="257" r:id="rId5"/>
-    <p:sldId id="258" r:id="rId6"/>
-    <p:sldId id="259" r:id="rId7"/>
-    <p:sldId id="260" r:id="rId8"/>
-    <p:sldId id="265" r:id="rId9"/>
-    <p:sldId id="266" r:id="rId10"/>
-    <p:sldId id="267" r:id="rId11"/>
-    <p:sldId id="269" r:id="rId12"/>
-    <p:sldId id="268" r:id="rId13"/>
-    <p:sldId id="261" r:id="rId14"/>
+    <p:sldId id="266" r:id="rId2"/>
+    <p:sldId id="267" r:id="rId3"/>
+    <p:sldId id="269" r:id="rId4"/>
+    <p:sldId id="268" r:id="rId5"/>
+    <p:sldId id="261" r:id="rId6"/>
   </p:sldIdLst>
   <p:sldSz cx="12192000" cy="6858000"/>
   <p:notesSz cx="6858000" cy="9144000"/>
@@ -295,7 +287,7 @@
           <a:p>
             <a:fld id="{A1859F04-D51F-4ABC-AD89-DF326765EE81}" type="datetimeFigureOut">
               <a:rPr lang="en-US" smtClean="0"/>
-              <a:t>8/4/2019</a:t>
+              <a:t>8/5/2019</a:t>
             </a:fld>
             <a:endParaRPr lang="en-US"/>
           </a:p>
@@ -610,7 +602,7 @@
           <a:p>
             <a:fld id="{A1859F04-D51F-4ABC-AD89-DF326765EE81}" type="datetimeFigureOut">
               <a:rPr lang="en-US" smtClean="0"/>
-              <a:t>8/4/2019</a:t>
+              <a:t>8/5/2019</a:t>
             </a:fld>
             <a:endParaRPr lang="en-US"/>
           </a:p>
@@ -832,7 +824,7 @@
           <a:p>
             <a:fld id="{A1859F04-D51F-4ABC-AD89-DF326765EE81}" type="datetimeFigureOut">
               <a:rPr lang="en-US" smtClean="0"/>
-              <a:t>8/4/2019</a:t>
+              <a:t>8/5/2019</a:t>
             </a:fld>
             <a:endParaRPr lang="en-US"/>
           </a:p>
@@ -1123,7 +1115,7 @@
           <a:p>
             <a:fld id="{A1859F04-D51F-4ABC-AD89-DF326765EE81}" type="datetimeFigureOut">
               <a:rPr lang="en-US" smtClean="0"/>
-              <a:t>8/4/2019</a:t>
+              <a:t>8/5/2019</a:t>
             </a:fld>
             <a:endParaRPr lang="en-US"/>
           </a:p>
@@ -1577,7 +1569,7 @@
           <a:p>
             <a:fld id="{A1859F04-D51F-4ABC-AD89-DF326765EE81}" type="datetimeFigureOut">
               <a:rPr lang="en-US" smtClean="0"/>
-              <a:t>8/4/2019</a:t>
+              <a:t>8/5/2019</a:t>
             </a:fld>
             <a:endParaRPr lang="en-US"/>
           </a:p>
@@ -2153,7 +2145,7 @@
           <a:p>
             <a:fld id="{A1859F04-D51F-4ABC-AD89-DF326765EE81}" type="datetimeFigureOut">
               <a:rPr lang="en-US" smtClean="0"/>
-              <a:t>8/4/2019</a:t>
+              <a:t>8/5/2019</a:t>
             </a:fld>
             <a:endParaRPr lang="en-US"/>
           </a:p>
@@ -3014,7 +3006,7 @@
           <a:p>
             <a:fld id="{A1859F04-D51F-4ABC-AD89-DF326765EE81}" type="datetimeFigureOut">
               <a:rPr lang="en-US" smtClean="0"/>
-              <a:t>8/4/2019</a:t>
+              <a:t>8/5/2019</a:t>
             </a:fld>
             <a:endParaRPr lang="en-US"/>
           </a:p>
@@ -3219,7 +3211,7 @@
           <a:p>
             <a:fld id="{A1859F04-D51F-4ABC-AD89-DF326765EE81}" type="datetimeFigureOut">
               <a:rPr lang="en-US" smtClean="0"/>
-              <a:t>8/4/2019</a:t>
+              <a:t>8/5/2019</a:t>
             </a:fld>
             <a:endParaRPr lang="en-US"/>
           </a:p>
@@ -3433,7 +3425,7 @@
           <a:p>
             <a:fld id="{A1859F04-D51F-4ABC-AD89-DF326765EE81}" type="datetimeFigureOut">
               <a:rPr lang="en-US" smtClean="0"/>
-              <a:t>8/4/2019</a:t>
+              <a:t>8/5/2019</a:t>
             </a:fld>
             <a:endParaRPr lang="en-US"/>
           </a:p>
@@ -3603,7 +3595,7 @@
           <a:p>
             <a:fld id="{A1859F04-D51F-4ABC-AD89-DF326765EE81}" type="datetimeFigureOut">
               <a:rPr lang="en-US" smtClean="0"/>
-              <a:t>8/4/2019</a:t>
+              <a:t>8/5/2019</a:t>
             </a:fld>
             <a:endParaRPr lang="en-US"/>
           </a:p>
@@ -3808,7 +3800,7 @@
           <a:p>
             <a:fld id="{A1859F04-D51F-4ABC-AD89-DF326765EE81}" type="datetimeFigureOut">
               <a:rPr lang="en-US" smtClean="0"/>
-              <a:t>8/4/2019</a:t>
+              <a:t>8/5/2019</a:t>
             </a:fld>
             <a:endParaRPr lang="en-US"/>
           </a:p>
@@ -4088,7 +4080,7 @@
           <a:p>
             <a:fld id="{A1859F04-D51F-4ABC-AD89-DF326765EE81}" type="datetimeFigureOut">
               <a:rPr lang="en-US" smtClean="0"/>
-              <a:t>8/4/2019</a:t>
+              <a:t>8/5/2019</a:t>
             </a:fld>
             <a:endParaRPr lang="en-US"/>
           </a:p>
@@ -4355,7 +4347,7 @@
           <a:p>
             <a:fld id="{A1859F04-D51F-4ABC-AD89-DF326765EE81}" type="datetimeFigureOut">
               <a:rPr lang="en-US" smtClean="0"/>
-              <a:t>8/4/2019</a:t>
+              <a:t>8/5/2019</a:t>
             </a:fld>
             <a:endParaRPr lang="en-US"/>
           </a:p>
@@ -4770,7 +4762,7 @@
           <a:p>
             <a:fld id="{A1859F04-D51F-4ABC-AD89-DF326765EE81}" type="datetimeFigureOut">
               <a:rPr lang="en-US" smtClean="0"/>
-              <a:t>8/4/2019</a:t>
+              <a:t>8/5/2019</a:t>
             </a:fld>
             <a:endParaRPr lang="en-US"/>
           </a:p>
@@ -4918,7 +4910,7 @@
           <a:p>
             <a:fld id="{A1859F04-D51F-4ABC-AD89-DF326765EE81}" type="datetimeFigureOut">
               <a:rPr lang="en-US" smtClean="0"/>
-              <a:t>8/4/2019</a:t>
+              <a:t>8/5/2019</a:t>
             </a:fld>
             <a:endParaRPr lang="en-US"/>
           </a:p>
@@ -5043,7 +5035,7 @@
           <a:p>
             <a:fld id="{A1859F04-D51F-4ABC-AD89-DF326765EE81}" type="datetimeFigureOut">
               <a:rPr lang="en-US" smtClean="0"/>
-              <a:t>8/4/2019</a:t>
+              <a:t>8/5/2019</a:t>
             </a:fld>
             <a:endParaRPr lang="en-US"/>
           </a:p>
@@ -5322,7 +5314,7 @@
           <a:p>
             <a:fld id="{A1859F04-D51F-4ABC-AD89-DF326765EE81}" type="datetimeFigureOut">
               <a:rPr lang="en-US" smtClean="0"/>
-              <a:t>8/4/2019</a:t>
+              <a:t>8/5/2019</a:t>
             </a:fld>
             <a:endParaRPr lang="en-US"/>
           </a:p>
@@ -5637,7 +5629,7 @@
           <a:p>
             <a:fld id="{A1859F04-D51F-4ABC-AD89-DF326765EE81}" type="datetimeFigureOut">
               <a:rPr lang="en-US" smtClean="0"/>
-              <a:t>8/4/2019</a:t>
+              <a:t>8/5/2019</a:t>
             </a:fld>
             <a:endParaRPr lang="en-US"/>
           </a:p>
@@ -5890,7 +5882,7 @@
           <a:p>
             <a:fld id="{A1859F04-D51F-4ABC-AD89-DF326765EE81}" type="datetimeFigureOut">
               <a:rPr lang="en-US" smtClean="0"/>
-              <a:t>8/4/2019</a:t>
+              <a:t>8/5/2019</a:t>
             </a:fld>
             <a:endParaRPr lang="en-US"/>
           </a:p>
@@ -6386,7 +6378,7 @@
           <p:cNvPr id="2" name="Title 1">
             <a:extLst>
               <a:ext uri="{FF2B5EF4-FFF2-40B4-BE49-F238E27FC236}">
-                <a16:creationId xmlns:a16="http://schemas.microsoft.com/office/drawing/2014/main" id="{0FB0EAAC-2176-420C-A60E-9D02D31F7EB5}"/>
+                <a16:creationId xmlns:a16="http://schemas.microsoft.com/office/drawing/2014/main" id="{214CC171-BCF1-4550-BD77-7B0A0917C103}"/>
               </a:ext>
             </a:extLst>
           </p:cNvPr>
@@ -6394,60 +6386,24 @@
             <a:spLocks noGrp="1"/>
           </p:cNvSpPr>
           <p:nvPr>
-            <p:ph type="ctrTitle"/>
-          </p:nvPr>
-        </p:nvSpPr>
-        <p:spPr>
-          <a:xfrm>
-            <a:off x="1524000" y="1122364"/>
-            <a:ext cx="9144000" cy="1382712"/>
+            <p:ph type="title"/>
+          </p:nvPr>
+        </p:nvSpPr>
+        <p:spPr>
+          <a:xfrm>
+            <a:off x="818525" y="1476375"/>
+            <a:ext cx="10364451" cy="2414719"/>
           </a:xfrm>
         </p:spPr>
         <p:txBody>
           <a:bodyPr>
-            <a:normAutofit fontScale="90000"/>
+            <a:normAutofit/>
           </a:bodyPr>
           <a:lstStyle/>
           <a:p>
             <a:r>
-              <a:rPr lang="en-US" dirty="0"/>
-              <a:t>Its all about Influenza </a:t>
-            </a:r>
-            <a:br>
-              <a:rPr lang="en-US" dirty="0"/>
-            </a:br>
-            <a:endParaRPr lang="en-US" dirty="0"/>
-          </a:p>
-        </p:txBody>
-      </p:sp>
-      <p:sp>
-        <p:nvSpPr>
-          <p:cNvPr id="3" name="Subtitle 2">
-            <a:extLst>
-              <a:ext uri="{FF2B5EF4-FFF2-40B4-BE49-F238E27FC236}">
-                <a16:creationId xmlns:a16="http://schemas.microsoft.com/office/drawing/2014/main" id="{3B19D2BA-980C-4790-8F3F-6B1A64A0D198}"/>
-              </a:ext>
-            </a:extLst>
-          </p:cNvPr>
-          <p:cNvSpPr>
-            <a:spLocks noGrp="1"/>
-          </p:cNvSpPr>
-          <p:nvPr>
-            <p:ph type="subTitle" idx="1"/>
-          </p:nvPr>
-        </p:nvSpPr>
-        <p:spPr/>
-        <p:txBody>
-          <a:bodyPr/>
-          <a:lstStyle/>
-          <a:p>
-            <a:r>
-              <a:rPr lang="en-US" dirty="0">
-                <a:solidFill>
-                  <a:schemeClr val="tx1"/>
-                </a:solidFill>
-              </a:rPr>
-              <a:t>flu</a:t>
+              <a:rPr lang="en-US" sz="8000" dirty="0"/>
+              <a:t>If we have more time</a:t>
             </a:r>
           </a:p>
         </p:txBody>
@@ -6455,7 +6411,7 @@
     </p:spTree>
     <p:extLst>
       <p:ext uri="{BB962C8B-B14F-4D97-AF65-F5344CB8AC3E}">
-        <p14:creationId xmlns:p14="http://schemas.microsoft.com/office/powerpoint/2010/main" val="4062717451"/>
+        <p14:creationId xmlns:p14="http://schemas.microsoft.com/office/powerpoint/2010/main" val="2090234231"/>
       </p:ext>
     </p:extLst>
   </p:cSld>
@@ -6465,7 +6421,7 @@
 </p:sld>
 </file>
 
-<file path=ppt/slides/slide10.xml><?xml version="1.0" encoding="utf-8"?>
+<file path=ppt/slides/slide2.xml><?xml version="1.0" encoding="utf-8"?>
 <p:sld xmlns:a="http://schemas.openxmlformats.org/drawingml/2006/main" xmlns:r="http://schemas.openxmlformats.org/officeDocument/2006/relationships" xmlns:p="http://schemas.openxmlformats.org/presentationml/2006/main">
   <p:cSld>
     <p:spTree>
@@ -6589,7 +6545,7 @@
 </p:sld>
 </file>
 
-<file path=ppt/slides/slide11.xml><?xml version="1.0" encoding="utf-8"?>
+<file path=ppt/slides/slide3.xml><?xml version="1.0" encoding="utf-8"?>
 <p:sld xmlns:a="http://schemas.openxmlformats.org/drawingml/2006/main" xmlns:r="http://schemas.openxmlformats.org/officeDocument/2006/relationships" xmlns:p="http://schemas.openxmlformats.org/presentationml/2006/main">
   <p:cSld>
     <p:spTree>
@@ -6743,7 +6699,7 @@
 </p:sld>
 </file>
 
-<file path=ppt/slides/slide12.xml><?xml version="1.0" encoding="utf-8"?>
+<file path=ppt/slides/slide4.xml><?xml version="1.0" encoding="utf-8"?>
 <p:sld xmlns:a="http://schemas.openxmlformats.org/drawingml/2006/main" xmlns:r="http://schemas.openxmlformats.org/officeDocument/2006/relationships" xmlns:p="http://schemas.openxmlformats.org/presentationml/2006/main">
   <p:cSld>
     <p:spTree>
@@ -6924,7 +6880,7 @@
 </p:sld>
 </file>
 
-<file path=ppt/slides/slide13.xml><?xml version="1.0" encoding="utf-8"?>
+<file path=ppt/slides/slide5.xml><?xml version="1.0" encoding="utf-8"?>
 <p:sld xmlns:a="http://schemas.openxmlformats.org/drawingml/2006/main" xmlns:r="http://schemas.openxmlformats.org/officeDocument/2006/relationships" xmlns:p="http://schemas.openxmlformats.org/presentationml/2006/main">
   <p:cSld>
     <p:spTree>
@@ -7312,1637 +7268,6 @@
     <p:extLst>
       <p:ext uri="{BB962C8B-B14F-4D97-AF65-F5344CB8AC3E}">
         <p14:creationId xmlns:p14="http://schemas.microsoft.com/office/powerpoint/2010/main" val="3848527772"/>
-      </p:ext>
-    </p:extLst>
-  </p:cSld>
-  <p:clrMapOvr>
-    <a:masterClrMapping/>
-  </p:clrMapOvr>
-</p:sld>
-</file>
-
-<file path=ppt/slides/slide2.xml><?xml version="1.0" encoding="utf-8"?>
-<p:sld xmlns:a="http://schemas.openxmlformats.org/drawingml/2006/main" xmlns:r="http://schemas.openxmlformats.org/officeDocument/2006/relationships" xmlns:p="http://schemas.openxmlformats.org/presentationml/2006/main">
-  <p:cSld>
-    <p:spTree>
-      <p:nvGrpSpPr>
-        <p:cNvPr id="1" name=""/>
-        <p:cNvGrpSpPr/>
-        <p:nvPr/>
-      </p:nvGrpSpPr>
-      <p:grpSpPr>
-        <a:xfrm>
-          <a:off x="0" y="0"/>
-          <a:ext cx="0" cy="0"/>
-          <a:chOff x="0" y="0"/>
-          <a:chExt cx="0" cy="0"/>
-        </a:xfrm>
-      </p:grpSpPr>
-      <p:sp>
-        <p:nvSpPr>
-          <p:cNvPr id="2" name="Title 1">
-            <a:extLst>
-              <a:ext uri="{FF2B5EF4-FFF2-40B4-BE49-F238E27FC236}">
-                <a16:creationId xmlns:a16="http://schemas.microsoft.com/office/drawing/2014/main" id="{7B1C94AD-E186-4763-86FC-D28A7AF49AD3}"/>
-              </a:ext>
-            </a:extLst>
-          </p:cNvPr>
-          <p:cNvSpPr>
-            <a:spLocks noGrp="1"/>
-          </p:cNvSpPr>
-          <p:nvPr>
-            <p:ph type="title"/>
-          </p:nvPr>
-        </p:nvSpPr>
-        <p:spPr>
-          <a:xfrm>
-            <a:off x="1" y="1"/>
-            <a:ext cx="12192000" cy="1127759"/>
-          </a:xfrm>
-        </p:spPr>
-        <p:txBody>
-          <a:bodyPr>
-            <a:normAutofit/>
-          </a:bodyPr>
-          <a:lstStyle/>
-          <a:p>
-            <a:r>
-              <a:rPr lang="en-US" sz="4800" b="1" dirty="0"/>
-              <a:t>random forest regression</a:t>
-            </a:r>
-            <a:endParaRPr lang="en-US" sz="4800" dirty="0"/>
-          </a:p>
-        </p:txBody>
-      </p:sp>
-      <p:pic>
-        <p:nvPicPr>
-          <p:cNvPr id="5" name="Content Placeholder 4" descr="A close up of a map&#10;&#10;Description automatically generated">
-            <a:extLst>
-              <a:ext uri="{FF2B5EF4-FFF2-40B4-BE49-F238E27FC236}">
-                <a16:creationId xmlns:a16="http://schemas.microsoft.com/office/drawing/2014/main" id="{305E294C-852B-49F4-A60C-3D1430AF7EC0}"/>
-              </a:ext>
-            </a:extLst>
-          </p:cNvPr>
-          <p:cNvPicPr>
-            <a:picLocks noGrp="1" noChangeAspect="1"/>
-          </p:cNvPicPr>
-          <p:nvPr>
-            <p:ph sz="quarter" idx="13"/>
-          </p:nvPr>
-        </p:nvPicPr>
-        <p:blipFill>
-          <a:blip r:embed="rId2">
-            <a:extLst>
-              <a:ext uri="{28A0092B-C50C-407E-A947-70E740481C1C}">
-                <a14:useLocalDpi xmlns:a14="http://schemas.microsoft.com/office/drawing/2010/main" val="0"/>
-              </a:ext>
-            </a:extLst>
-          </a:blip>
-          <a:stretch>
-            <a:fillRect/>
-          </a:stretch>
-        </p:blipFill>
-        <p:spPr>
-          <a:xfrm>
-            <a:off x="5781040" y="985520"/>
-            <a:ext cx="6410960" cy="5872479"/>
-          </a:xfrm>
-        </p:spPr>
-      </p:pic>
-      <p:sp>
-        <p:nvSpPr>
-          <p:cNvPr id="6" name="Content Placeholder 2">
-            <a:extLst>
-              <a:ext uri="{FF2B5EF4-FFF2-40B4-BE49-F238E27FC236}">
-                <a16:creationId xmlns:a16="http://schemas.microsoft.com/office/drawing/2014/main" id="{B9D2C4EB-4757-4F66-B6D3-DBB4F8811A48}"/>
-              </a:ext>
-            </a:extLst>
-          </p:cNvPr>
-          <p:cNvSpPr txBox="1">
-            <a:spLocks/>
-          </p:cNvSpPr>
-          <p:nvPr/>
-        </p:nvSpPr>
-        <p:spPr>
-          <a:xfrm>
-            <a:off x="0" y="1233055"/>
-            <a:ext cx="5781039" cy="5624945"/>
-          </a:xfrm>
-          <a:prstGeom prst="rect">
-            <a:avLst/>
-          </a:prstGeom>
-        </p:spPr>
-        <p:txBody>
-          <a:bodyPr>
-            <a:normAutofit/>
-          </a:bodyPr>
-          <a:lstStyle>
-            <a:lvl1pPr marL="228600" indent="-228600" algn="l" defTabSz="914400" rtl="0" eaLnBrk="1" latinLnBrk="0" hangingPunct="1">
-              <a:lnSpc>
-                <a:spcPct val="120000"/>
-              </a:lnSpc>
-              <a:spcBef>
-                <a:spcPts val="1000"/>
-              </a:spcBef>
-              <a:buClr>
-                <a:schemeClr val="tx1"/>
-              </a:buClr>
-              <a:buFont typeface="Arial" panose="020B0604020202020204" pitchFamily="34" charset="0"/>
-              <a:buChar char="•"/>
-              <a:defRPr sz="2000" kern="1200" cap="all" baseline="0">
-                <a:solidFill>
-                  <a:schemeClr val="tx1"/>
-                </a:solidFill>
-                <a:effectLst/>
-                <a:latin typeface="+mn-lt"/>
-                <a:ea typeface="+mn-ea"/>
-                <a:cs typeface="+mn-cs"/>
-              </a:defRPr>
-            </a:lvl1pPr>
-            <a:lvl2pPr marL="685800" indent="-228600" algn="l" defTabSz="914400" rtl="0" eaLnBrk="1" latinLnBrk="0" hangingPunct="1">
-              <a:lnSpc>
-                <a:spcPct val="120000"/>
-              </a:lnSpc>
-              <a:spcBef>
-                <a:spcPts val="500"/>
-              </a:spcBef>
-              <a:buClr>
-                <a:schemeClr val="tx1"/>
-              </a:buClr>
-              <a:buFont typeface="Arial" panose="020B0604020202020204" pitchFamily="34" charset="0"/>
-              <a:buChar char="•"/>
-              <a:defRPr sz="1800" kern="1200" cap="all" baseline="0">
-                <a:solidFill>
-                  <a:schemeClr val="tx1"/>
-                </a:solidFill>
-                <a:effectLst/>
-                <a:latin typeface="+mn-lt"/>
-                <a:ea typeface="+mn-ea"/>
-                <a:cs typeface="+mn-cs"/>
-              </a:defRPr>
-            </a:lvl2pPr>
-            <a:lvl3pPr marL="1143000" indent="-228600" algn="l" defTabSz="914400" rtl="0" eaLnBrk="1" latinLnBrk="0" hangingPunct="1">
-              <a:lnSpc>
-                <a:spcPct val="120000"/>
-              </a:lnSpc>
-              <a:spcBef>
-                <a:spcPts val="500"/>
-              </a:spcBef>
-              <a:buClr>
-                <a:schemeClr val="tx1"/>
-              </a:buClr>
-              <a:buFont typeface="Arial" panose="020B0604020202020204" pitchFamily="34" charset="0"/>
-              <a:buChar char="•"/>
-              <a:defRPr sz="1600" kern="1200" cap="all" baseline="0">
-                <a:solidFill>
-                  <a:schemeClr val="tx1"/>
-                </a:solidFill>
-                <a:effectLst/>
-                <a:latin typeface="+mn-lt"/>
-                <a:ea typeface="+mn-ea"/>
-                <a:cs typeface="+mn-cs"/>
-              </a:defRPr>
-            </a:lvl3pPr>
-            <a:lvl4pPr marL="1600200" indent="-228600" algn="l" defTabSz="914400" rtl="0" eaLnBrk="1" latinLnBrk="0" hangingPunct="1">
-              <a:lnSpc>
-                <a:spcPct val="120000"/>
-              </a:lnSpc>
-              <a:spcBef>
-                <a:spcPts val="500"/>
-              </a:spcBef>
-              <a:buClr>
-                <a:schemeClr val="tx1"/>
-              </a:buClr>
-              <a:buFont typeface="Arial" panose="020B0604020202020204" pitchFamily="34" charset="0"/>
-              <a:buChar char="•"/>
-              <a:defRPr sz="1400" kern="1200" cap="all" baseline="0">
-                <a:solidFill>
-                  <a:schemeClr val="tx1"/>
-                </a:solidFill>
-                <a:effectLst/>
-                <a:latin typeface="+mn-lt"/>
-                <a:ea typeface="+mn-ea"/>
-                <a:cs typeface="+mn-cs"/>
-              </a:defRPr>
-            </a:lvl4pPr>
-            <a:lvl5pPr marL="2057400" indent="-228600" algn="l" defTabSz="914400" rtl="0" eaLnBrk="1" latinLnBrk="0" hangingPunct="1">
-              <a:lnSpc>
-                <a:spcPct val="120000"/>
-              </a:lnSpc>
-              <a:spcBef>
-                <a:spcPts val="500"/>
-              </a:spcBef>
-              <a:buClr>
-                <a:schemeClr val="tx1"/>
-              </a:buClr>
-              <a:buFont typeface="Arial" panose="020B0604020202020204" pitchFamily="34" charset="0"/>
-              <a:buChar char="•"/>
-              <a:defRPr sz="1400" kern="1200" cap="all" baseline="0">
-                <a:solidFill>
-                  <a:schemeClr val="tx1"/>
-                </a:solidFill>
-                <a:effectLst/>
-                <a:latin typeface="+mn-lt"/>
-                <a:ea typeface="+mn-ea"/>
-                <a:cs typeface="+mn-cs"/>
-              </a:defRPr>
-            </a:lvl5pPr>
-            <a:lvl6pPr marL="2514600" indent="-228600" algn="l" defTabSz="914400" rtl="0" eaLnBrk="1" latinLnBrk="0" hangingPunct="1">
-              <a:lnSpc>
-                <a:spcPct val="120000"/>
-              </a:lnSpc>
-              <a:spcBef>
-                <a:spcPts val="500"/>
-              </a:spcBef>
-              <a:buClr>
-                <a:schemeClr val="tx1"/>
-              </a:buClr>
-              <a:buFont typeface="Arial" panose="020B0604020202020204" pitchFamily="34" charset="0"/>
-              <a:buChar char="•"/>
-              <a:defRPr sz="1400" kern="1200" cap="all" baseline="0">
-                <a:solidFill>
-                  <a:schemeClr val="tx1"/>
-                </a:solidFill>
-                <a:effectLst/>
-                <a:latin typeface="+mn-lt"/>
-                <a:ea typeface="+mn-ea"/>
-                <a:cs typeface="+mn-cs"/>
-              </a:defRPr>
-            </a:lvl6pPr>
-            <a:lvl7pPr marL="2971800" indent="-228600" algn="l" defTabSz="914400" rtl="0" eaLnBrk="1" latinLnBrk="0" hangingPunct="1">
-              <a:lnSpc>
-                <a:spcPct val="120000"/>
-              </a:lnSpc>
-              <a:spcBef>
-                <a:spcPts val="500"/>
-              </a:spcBef>
-              <a:buClr>
-                <a:schemeClr val="tx1"/>
-              </a:buClr>
-              <a:buFont typeface="Arial" panose="020B0604020202020204" pitchFamily="34" charset="0"/>
-              <a:buChar char="•"/>
-              <a:defRPr sz="1400" kern="1200" cap="all" baseline="0">
-                <a:solidFill>
-                  <a:schemeClr val="tx1"/>
-                </a:solidFill>
-                <a:effectLst/>
-                <a:latin typeface="+mn-lt"/>
-                <a:ea typeface="+mn-ea"/>
-                <a:cs typeface="+mn-cs"/>
-              </a:defRPr>
-            </a:lvl7pPr>
-            <a:lvl8pPr marL="3429000" indent="-228600" algn="l" defTabSz="914400" rtl="0" eaLnBrk="1" latinLnBrk="0" hangingPunct="1">
-              <a:lnSpc>
-                <a:spcPct val="120000"/>
-              </a:lnSpc>
-              <a:spcBef>
-                <a:spcPts val="500"/>
-              </a:spcBef>
-              <a:buClr>
-                <a:schemeClr val="tx1"/>
-              </a:buClr>
-              <a:buFont typeface="Arial" panose="020B0604020202020204" pitchFamily="34" charset="0"/>
-              <a:buChar char="•"/>
-              <a:defRPr sz="1400" kern="1200" cap="all" baseline="0">
-                <a:solidFill>
-                  <a:schemeClr val="tx1"/>
-                </a:solidFill>
-                <a:effectLst/>
-                <a:latin typeface="+mn-lt"/>
-                <a:ea typeface="+mn-ea"/>
-                <a:cs typeface="+mn-cs"/>
-              </a:defRPr>
-            </a:lvl8pPr>
-            <a:lvl9pPr marL="3886200" indent="-228600" algn="l" defTabSz="914400" rtl="0" eaLnBrk="1" latinLnBrk="0" hangingPunct="1">
-              <a:lnSpc>
-                <a:spcPct val="120000"/>
-              </a:lnSpc>
-              <a:spcBef>
-                <a:spcPts val="500"/>
-              </a:spcBef>
-              <a:buClr>
-                <a:schemeClr val="tx1"/>
-              </a:buClr>
-              <a:buFont typeface="Arial" panose="020B0604020202020204" pitchFamily="34" charset="0"/>
-              <a:buChar char="•"/>
-              <a:defRPr sz="1400" kern="1200" cap="all" baseline="0">
-                <a:solidFill>
-                  <a:schemeClr val="tx1"/>
-                </a:solidFill>
-                <a:effectLst/>
-                <a:latin typeface="+mn-lt"/>
-                <a:ea typeface="+mn-ea"/>
-                <a:cs typeface="+mn-cs"/>
-              </a:defRPr>
-            </a:lvl9pPr>
-          </a:lstStyle>
-          <a:p>
-            <a:endParaRPr lang="en-US" dirty="0"/>
-          </a:p>
-        </p:txBody>
-      </p:sp>
-      <p:sp>
-        <p:nvSpPr>
-          <p:cNvPr id="7" name="Content Placeholder 2">
-            <a:extLst>
-              <a:ext uri="{FF2B5EF4-FFF2-40B4-BE49-F238E27FC236}">
-                <a16:creationId xmlns:a16="http://schemas.microsoft.com/office/drawing/2014/main" id="{38740A23-2DB1-482A-93E7-DBD66A27D870}"/>
-              </a:ext>
-            </a:extLst>
-          </p:cNvPr>
-          <p:cNvSpPr txBox="1">
-            <a:spLocks/>
-          </p:cNvSpPr>
-          <p:nvPr/>
-        </p:nvSpPr>
-        <p:spPr>
-          <a:xfrm>
-            <a:off x="0" y="1737359"/>
-            <a:ext cx="5781039" cy="5120641"/>
-          </a:xfrm>
-          <a:prstGeom prst="rect">
-            <a:avLst/>
-          </a:prstGeom>
-        </p:spPr>
-        <p:txBody>
-          <a:bodyPr>
-            <a:normAutofit/>
-          </a:bodyPr>
-          <a:lstStyle>
-            <a:lvl1pPr marL="228600" indent="-228600" algn="l" defTabSz="914400" rtl="0" eaLnBrk="1" latinLnBrk="0" hangingPunct="1">
-              <a:lnSpc>
-                <a:spcPct val="120000"/>
-              </a:lnSpc>
-              <a:spcBef>
-                <a:spcPts val="1000"/>
-              </a:spcBef>
-              <a:buClr>
-                <a:schemeClr val="tx1"/>
-              </a:buClr>
-              <a:buFont typeface="Arial" panose="020B0604020202020204" pitchFamily="34" charset="0"/>
-              <a:buChar char="•"/>
-              <a:defRPr sz="2000" kern="1200" cap="all" baseline="0">
-                <a:solidFill>
-                  <a:schemeClr val="tx1"/>
-                </a:solidFill>
-                <a:effectLst/>
-                <a:latin typeface="+mn-lt"/>
-                <a:ea typeface="+mn-ea"/>
-                <a:cs typeface="+mn-cs"/>
-              </a:defRPr>
-            </a:lvl1pPr>
-            <a:lvl2pPr marL="685800" indent="-228600" algn="l" defTabSz="914400" rtl="0" eaLnBrk="1" latinLnBrk="0" hangingPunct="1">
-              <a:lnSpc>
-                <a:spcPct val="120000"/>
-              </a:lnSpc>
-              <a:spcBef>
-                <a:spcPts val="500"/>
-              </a:spcBef>
-              <a:buClr>
-                <a:schemeClr val="tx1"/>
-              </a:buClr>
-              <a:buFont typeface="Arial" panose="020B0604020202020204" pitchFamily="34" charset="0"/>
-              <a:buChar char="•"/>
-              <a:defRPr sz="1800" kern="1200" cap="all" baseline="0">
-                <a:solidFill>
-                  <a:schemeClr val="tx1"/>
-                </a:solidFill>
-                <a:effectLst/>
-                <a:latin typeface="+mn-lt"/>
-                <a:ea typeface="+mn-ea"/>
-                <a:cs typeface="+mn-cs"/>
-              </a:defRPr>
-            </a:lvl2pPr>
-            <a:lvl3pPr marL="1143000" indent="-228600" algn="l" defTabSz="914400" rtl="0" eaLnBrk="1" latinLnBrk="0" hangingPunct="1">
-              <a:lnSpc>
-                <a:spcPct val="120000"/>
-              </a:lnSpc>
-              <a:spcBef>
-                <a:spcPts val="500"/>
-              </a:spcBef>
-              <a:buClr>
-                <a:schemeClr val="tx1"/>
-              </a:buClr>
-              <a:buFont typeface="Arial" panose="020B0604020202020204" pitchFamily="34" charset="0"/>
-              <a:buChar char="•"/>
-              <a:defRPr sz="1600" kern="1200" cap="all" baseline="0">
-                <a:solidFill>
-                  <a:schemeClr val="tx1"/>
-                </a:solidFill>
-                <a:effectLst/>
-                <a:latin typeface="+mn-lt"/>
-                <a:ea typeface="+mn-ea"/>
-                <a:cs typeface="+mn-cs"/>
-              </a:defRPr>
-            </a:lvl3pPr>
-            <a:lvl4pPr marL="1600200" indent="-228600" algn="l" defTabSz="914400" rtl="0" eaLnBrk="1" latinLnBrk="0" hangingPunct="1">
-              <a:lnSpc>
-                <a:spcPct val="120000"/>
-              </a:lnSpc>
-              <a:spcBef>
-                <a:spcPts val="500"/>
-              </a:spcBef>
-              <a:buClr>
-                <a:schemeClr val="tx1"/>
-              </a:buClr>
-              <a:buFont typeface="Arial" panose="020B0604020202020204" pitchFamily="34" charset="0"/>
-              <a:buChar char="•"/>
-              <a:defRPr sz="1400" kern="1200" cap="all" baseline="0">
-                <a:solidFill>
-                  <a:schemeClr val="tx1"/>
-                </a:solidFill>
-                <a:effectLst/>
-                <a:latin typeface="+mn-lt"/>
-                <a:ea typeface="+mn-ea"/>
-                <a:cs typeface="+mn-cs"/>
-              </a:defRPr>
-            </a:lvl4pPr>
-            <a:lvl5pPr marL="2057400" indent="-228600" algn="l" defTabSz="914400" rtl="0" eaLnBrk="1" latinLnBrk="0" hangingPunct="1">
-              <a:lnSpc>
-                <a:spcPct val="120000"/>
-              </a:lnSpc>
-              <a:spcBef>
-                <a:spcPts val="500"/>
-              </a:spcBef>
-              <a:buClr>
-                <a:schemeClr val="tx1"/>
-              </a:buClr>
-              <a:buFont typeface="Arial" panose="020B0604020202020204" pitchFamily="34" charset="0"/>
-              <a:buChar char="•"/>
-              <a:defRPr sz="1400" kern="1200" cap="all" baseline="0">
-                <a:solidFill>
-                  <a:schemeClr val="tx1"/>
-                </a:solidFill>
-                <a:effectLst/>
-                <a:latin typeface="+mn-lt"/>
-                <a:ea typeface="+mn-ea"/>
-                <a:cs typeface="+mn-cs"/>
-              </a:defRPr>
-            </a:lvl5pPr>
-            <a:lvl6pPr marL="2514600" indent="-228600" algn="l" defTabSz="914400" rtl="0" eaLnBrk="1" latinLnBrk="0" hangingPunct="1">
-              <a:lnSpc>
-                <a:spcPct val="120000"/>
-              </a:lnSpc>
-              <a:spcBef>
-                <a:spcPts val="500"/>
-              </a:spcBef>
-              <a:buClr>
-                <a:schemeClr val="tx1"/>
-              </a:buClr>
-              <a:buFont typeface="Arial" panose="020B0604020202020204" pitchFamily="34" charset="0"/>
-              <a:buChar char="•"/>
-              <a:defRPr sz="1400" kern="1200" cap="all" baseline="0">
-                <a:solidFill>
-                  <a:schemeClr val="tx1"/>
-                </a:solidFill>
-                <a:effectLst/>
-                <a:latin typeface="+mn-lt"/>
-                <a:ea typeface="+mn-ea"/>
-                <a:cs typeface="+mn-cs"/>
-              </a:defRPr>
-            </a:lvl6pPr>
-            <a:lvl7pPr marL="2971800" indent="-228600" algn="l" defTabSz="914400" rtl="0" eaLnBrk="1" latinLnBrk="0" hangingPunct="1">
-              <a:lnSpc>
-                <a:spcPct val="120000"/>
-              </a:lnSpc>
-              <a:spcBef>
-                <a:spcPts val="500"/>
-              </a:spcBef>
-              <a:buClr>
-                <a:schemeClr val="tx1"/>
-              </a:buClr>
-              <a:buFont typeface="Arial" panose="020B0604020202020204" pitchFamily="34" charset="0"/>
-              <a:buChar char="•"/>
-              <a:defRPr sz="1400" kern="1200" cap="all" baseline="0">
-                <a:solidFill>
-                  <a:schemeClr val="tx1"/>
-                </a:solidFill>
-                <a:effectLst/>
-                <a:latin typeface="+mn-lt"/>
-                <a:ea typeface="+mn-ea"/>
-                <a:cs typeface="+mn-cs"/>
-              </a:defRPr>
-            </a:lvl7pPr>
-            <a:lvl8pPr marL="3429000" indent="-228600" algn="l" defTabSz="914400" rtl="0" eaLnBrk="1" latinLnBrk="0" hangingPunct="1">
-              <a:lnSpc>
-                <a:spcPct val="120000"/>
-              </a:lnSpc>
-              <a:spcBef>
-                <a:spcPts val="500"/>
-              </a:spcBef>
-              <a:buClr>
-                <a:schemeClr val="tx1"/>
-              </a:buClr>
-              <a:buFont typeface="Arial" panose="020B0604020202020204" pitchFamily="34" charset="0"/>
-              <a:buChar char="•"/>
-              <a:defRPr sz="1400" kern="1200" cap="all" baseline="0">
-                <a:solidFill>
-                  <a:schemeClr val="tx1"/>
-                </a:solidFill>
-                <a:effectLst/>
-                <a:latin typeface="+mn-lt"/>
-                <a:ea typeface="+mn-ea"/>
-                <a:cs typeface="+mn-cs"/>
-              </a:defRPr>
-            </a:lvl8pPr>
-            <a:lvl9pPr marL="3886200" indent="-228600" algn="l" defTabSz="914400" rtl="0" eaLnBrk="1" latinLnBrk="0" hangingPunct="1">
-              <a:lnSpc>
-                <a:spcPct val="120000"/>
-              </a:lnSpc>
-              <a:spcBef>
-                <a:spcPts val="500"/>
-              </a:spcBef>
-              <a:buClr>
-                <a:schemeClr val="tx1"/>
-              </a:buClr>
-              <a:buFont typeface="Arial" panose="020B0604020202020204" pitchFamily="34" charset="0"/>
-              <a:buChar char="•"/>
-              <a:defRPr sz="1400" kern="1200" cap="all" baseline="0">
-                <a:solidFill>
-                  <a:schemeClr val="tx1"/>
-                </a:solidFill>
-                <a:effectLst/>
-                <a:latin typeface="+mn-lt"/>
-                <a:ea typeface="+mn-ea"/>
-                <a:cs typeface="+mn-cs"/>
-              </a:defRPr>
-            </a:lvl9pPr>
-          </a:lstStyle>
-          <a:p>
-            <a:r>
-              <a:rPr lang="en-US" dirty="0" err="1"/>
-              <a:t>ddddddddddddddddd</a:t>
-            </a:r>
-            <a:endParaRPr lang="en-US" dirty="0"/>
-          </a:p>
-        </p:txBody>
-      </p:sp>
-    </p:spTree>
-    <p:extLst>
-      <p:ext uri="{BB962C8B-B14F-4D97-AF65-F5344CB8AC3E}">
-        <p14:creationId xmlns:p14="http://schemas.microsoft.com/office/powerpoint/2010/main" val="219432456"/>
-      </p:ext>
-    </p:extLst>
-  </p:cSld>
-  <p:clrMapOvr>
-    <a:masterClrMapping/>
-  </p:clrMapOvr>
-</p:sld>
-</file>
-
-<file path=ppt/slides/slide3.xml><?xml version="1.0" encoding="utf-8"?>
-<p:sld xmlns:a="http://schemas.openxmlformats.org/drawingml/2006/main" xmlns:r="http://schemas.openxmlformats.org/officeDocument/2006/relationships" xmlns:p="http://schemas.openxmlformats.org/presentationml/2006/main">
-  <p:cSld>
-    <p:spTree>
-      <p:nvGrpSpPr>
-        <p:cNvPr id="1" name=""/>
-        <p:cNvGrpSpPr/>
-        <p:nvPr/>
-      </p:nvGrpSpPr>
-      <p:grpSpPr>
-        <a:xfrm>
-          <a:off x="0" y="0"/>
-          <a:ext cx="0" cy="0"/>
-          <a:chOff x="0" y="0"/>
-          <a:chExt cx="0" cy="0"/>
-        </a:xfrm>
-      </p:grpSpPr>
-      <p:sp>
-        <p:nvSpPr>
-          <p:cNvPr id="2" name="Title 1">
-            <a:extLst>
-              <a:ext uri="{FF2B5EF4-FFF2-40B4-BE49-F238E27FC236}">
-                <a16:creationId xmlns:a16="http://schemas.microsoft.com/office/drawing/2014/main" id="{A4755A63-9C66-43C6-BD5F-C3FF845E7BF0}"/>
-              </a:ext>
-            </a:extLst>
-          </p:cNvPr>
-          <p:cNvSpPr>
-            <a:spLocks noGrp="1"/>
-          </p:cNvSpPr>
-          <p:nvPr>
-            <p:ph type="title"/>
-          </p:nvPr>
-        </p:nvSpPr>
-        <p:spPr/>
-        <p:txBody>
-          <a:bodyPr/>
-          <a:lstStyle/>
-          <a:p>
-            <a:endParaRPr lang="en-US"/>
-          </a:p>
-        </p:txBody>
-      </p:sp>
-      <p:sp>
-        <p:nvSpPr>
-          <p:cNvPr id="3" name="Content Placeholder 2">
-            <a:extLst>
-              <a:ext uri="{FF2B5EF4-FFF2-40B4-BE49-F238E27FC236}">
-                <a16:creationId xmlns:a16="http://schemas.microsoft.com/office/drawing/2014/main" id="{65307794-4B37-4C03-81D8-D094C79E8254}"/>
-              </a:ext>
-            </a:extLst>
-          </p:cNvPr>
-          <p:cNvSpPr>
-            <a:spLocks noGrp="1"/>
-          </p:cNvSpPr>
-          <p:nvPr>
-            <p:ph sz="quarter" idx="13"/>
-          </p:nvPr>
-        </p:nvSpPr>
-        <p:spPr/>
-        <p:txBody>
-          <a:bodyPr/>
-          <a:lstStyle/>
-          <a:p>
-            <a:endParaRPr lang="en-US"/>
-          </a:p>
-        </p:txBody>
-      </p:sp>
-    </p:spTree>
-    <p:extLst>
-      <p:ext uri="{BB962C8B-B14F-4D97-AF65-F5344CB8AC3E}">
-        <p14:creationId xmlns:p14="http://schemas.microsoft.com/office/powerpoint/2010/main" val="2620187492"/>
-      </p:ext>
-    </p:extLst>
-  </p:cSld>
-  <p:clrMapOvr>
-    <a:masterClrMapping/>
-  </p:clrMapOvr>
-</p:sld>
-</file>
-
-<file path=ppt/slides/slide4.xml><?xml version="1.0" encoding="utf-8"?>
-<p:sld xmlns:a="http://schemas.openxmlformats.org/drawingml/2006/main" xmlns:r="http://schemas.openxmlformats.org/officeDocument/2006/relationships" xmlns:p="http://schemas.openxmlformats.org/presentationml/2006/main">
-  <p:cSld>
-    <p:spTree>
-      <p:nvGrpSpPr>
-        <p:cNvPr id="1" name=""/>
-        <p:cNvGrpSpPr/>
-        <p:nvPr/>
-      </p:nvGrpSpPr>
-      <p:grpSpPr>
-        <a:xfrm>
-          <a:off x="0" y="0"/>
-          <a:ext cx="0" cy="0"/>
-          <a:chOff x="0" y="0"/>
-          <a:chExt cx="0" cy="0"/>
-        </a:xfrm>
-      </p:grpSpPr>
-      <p:sp>
-        <p:nvSpPr>
-          <p:cNvPr id="2" name="Title 1">
-            <a:extLst>
-              <a:ext uri="{FF2B5EF4-FFF2-40B4-BE49-F238E27FC236}">
-                <a16:creationId xmlns:a16="http://schemas.microsoft.com/office/drawing/2014/main" id="{189E9995-E0FD-4E1E-8045-CAD773456495}"/>
-              </a:ext>
-            </a:extLst>
-          </p:cNvPr>
-          <p:cNvSpPr>
-            <a:spLocks noGrp="1"/>
-          </p:cNvSpPr>
-          <p:nvPr>
-            <p:ph type="title"/>
-          </p:nvPr>
-        </p:nvSpPr>
-        <p:spPr>
-          <a:xfrm>
-            <a:off x="1038466" y="192512"/>
-            <a:ext cx="10364451" cy="874288"/>
-          </a:xfrm>
-        </p:spPr>
-        <p:txBody>
-          <a:bodyPr>
-            <a:normAutofit/>
-          </a:bodyPr>
-          <a:lstStyle/>
-          <a:p>
-            <a:r>
-              <a:rPr lang="en-US" b="1" dirty="0"/>
-              <a:t>random forest regression</a:t>
-            </a:r>
-            <a:endParaRPr lang="en-US" dirty="0"/>
-          </a:p>
-        </p:txBody>
-      </p:sp>
-      <p:sp>
-        <p:nvSpPr>
-          <p:cNvPr id="3" name="Content Placeholder 2">
-            <a:extLst>
-              <a:ext uri="{FF2B5EF4-FFF2-40B4-BE49-F238E27FC236}">
-                <a16:creationId xmlns:a16="http://schemas.microsoft.com/office/drawing/2014/main" id="{352B7DBF-A279-4944-82C5-EB24D16D0B2D}"/>
-              </a:ext>
-            </a:extLst>
-          </p:cNvPr>
-          <p:cNvSpPr>
-            <a:spLocks noGrp="1"/>
-          </p:cNvSpPr>
-          <p:nvPr>
-            <p:ph idx="1"/>
-          </p:nvPr>
-        </p:nvSpPr>
-        <p:spPr>
-          <a:xfrm>
-            <a:off x="0" y="1233055"/>
-            <a:ext cx="11998036" cy="5624945"/>
-          </a:xfrm>
-        </p:spPr>
-        <p:txBody>
-          <a:bodyPr>
-            <a:normAutofit/>
-          </a:bodyPr>
-          <a:lstStyle/>
-          <a:p>
-            <a:r>
-              <a:rPr lang="en-US" dirty="0" err="1"/>
-              <a:t>ddddddddddddddddd</a:t>
-            </a:r>
-            <a:endParaRPr lang="en-US" dirty="0"/>
-          </a:p>
-        </p:txBody>
-      </p:sp>
-    </p:spTree>
-    <p:extLst>
-      <p:ext uri="{BB962C8B-B14F-4D97-AF65-F5344CB8AC3E}">
-        <p14:creationId xmlns:p14="http://schemas.microsoft.com/office/powerpoint/2010/main" val="1566375216"/>
-      </p:ext>
-    </p:extLst>
-  </p:cSld>
-  <p:clrMapOvr>
-    <a:masterClrMapping/>
-  </p:clrMapOvr>
-</p:sld>
-</file>
-
-<file path=ppt/slides/slide5.xml><?xml version="1.0" encoding="utf-8"?>
-<p:sld xmlns:a="http://schemas.openxmlformats.org/drawingml/2006/main" xmlns:r="http://schemas.openxmlformats.org/officeDocument/2006/relationships" xmlns:p="http://schemas.openxmlformats.org/presentationml/2006/main">
-  <p:cSld>
-    <p:spTree>
-      <p:nvGrpSpPr>
-        <p:cNvPr id="1" name=""/>
-        <p:cNvGrpSpPr/>
-        <p:nvPr/>
-      </p:nvGrpSpPr>
-      <p:grpSpPr>
-        <a:xfrm>
-          <a:off x="0" y="0"/>
-          <a:ext cx="0" cy="0"/>
-          <a:chOff x="0" y="0"/>
-          <a:chExt cx="0" cy="0"/>
-        </a:xfrm>
-      </p:grpSpPr>
-      <p:sp>
-        <p:nvSpPr>
-          <p:cNvPr id="2" name="Title 1">
-            <a:extLst>
-              <a:ext uri="{FF2B5EF4-FFF2-40B4-BE49-F238E27FC236}">
-                <a16:creationId xmlns:a16="http://schemas.microsoft.com/office/drawing/2014/main" id="{71729EC4-75A4-4ED7-8369-BEB740CA5ED8}"/>
-              </a:ext>
-            </a:extLst>
-          </p:cNvPr>
-          <p:cNvSpPr>
-            <a:spLocks noGrp="1"/>
-          </p:cNvSpPr>
-          <p:nvPr>
-            <p:ph type="title"/>
-          </p:nvPr>
-        </p:nvSpPr>
-        <p:spPr>
-          <a:xfrm>
-            <a:off x="913774" y="120677"/>
-            <a:ext cx="10364451" cy="1017243"/>
-          </a:xfrm>
-        </p:spPr>
-        <p:txBody>
-          <a:bodyPr/>
-          <a:lstStyle/>
-          <a:p>
-            <a:r>
-              <a:rPr lang="en-US" b="1" dirty="0"/>
-              <a:t>Gradian Boost regression</a:t>
-            </a:r>
-            <a:endParaRPr lang="en-US" dirty="0"/>
-          </a:p>
-        </p:txBody>
-      </p:sp>
-      <p:sp>
-        <p:nvSpPr>
-          <p:cNvPr id="3" name="Content Placeholder 2">
-            <a:extLst>
-              <a:ext uri="{FF2B5EF4-FFF2-40B4-BE49-F238E27FC236}">
-                <a16:creationId xmlns:a16="http://schemas.microsoft.com/office/drawing/2014/main" id="{E80F0691-4EEE-4001-B434-A664B8AA41AC}"/>
-              </a:ext>
-            </a:extLst>
-          </p:cNvPr>
-          <p:cNvSpPr>
-            <a:spLocks noGrp="1"/>
-          </p:cNvSpPr>
-          <p:nvPr>
-            <p:ph idx="1"/>
-          </p:nvPr>
-        </p:nvSpPr>
-        <p:spPr>
-          <a:xfrm>
-            <a:off x="172720" y="1066800"/>
-            <a:ext cx="5770880" cy="5670523"/>
-          </a:xfrm>
-        </p:spPr>
-        <p:txBody>
-          <a:bodyPr/>
-          <a:lstStyle/>
-          <a:p>
-            <a:r>
-              <a:rPr lang="en-US" b="1" dirty="0"/>
-              <a:t>random</a:t>
-            </a:r>
-            <a:endParaRPr lang="en-US" dirty="0"/>
-          </a:p>
-        </p:txBody>
-      </p:sp>
-    </p:spTree>
-    <p:extLst>
-      <p:ext uri="{BB962C8B-B14F-4D97-AF65-F5344CB8AC3E}">
-        <p14:creationId xmlns:p14="http://schemas.microsoft.com/office/powerpoint/2010/main" val="2788361485"/>
-      </p:ext>
-    </p:extLst>
-  </p:cSld>
-  <p:clrMapOvr>
-    <a:masterClrMapping/>
-  </p:clrMapOvr>
-</p:sld>
-</file>
-
-<file path=ppt/slides/slide6.xml><?xml version="1.0" encoding="utf-8"?>
-<p:sld xmlns:a="http://schemas.openxmlformats.org/drawingml/2006/main" xmlns:r="http://schemas.openxmlformats.org/officeDocument/2006/relationships" xmlns:p="http://schemas.openxmlformats.org/presentationml/2006/main">
-  <p:cSld>
-    <p:spTree>
-      <p:nvGrpSpPr>
-        <p:cNvPr id="1" name=""/>
-        <p:cNvGrpSpPr/>
-        <p:nvPr/>
-      </p:nvGrpSpPr>
-      <p:grpSpPr>
-        <a:xfrm>
-          <a:off x="0" y="0"/>
-          <a:ext cx="0" cy="0"/>
-          <a:chOff x="0" y="0"/>
-          <a:chExt cx="0" cy="0"/>
-        </a:xfrm>
-      </p:grpSpPr>
-      <p:sp>
-        <p:nvSpPr>
-          <p:cNvPr id="2" name="Title 1">
-            <a:extLst>
-              <a:ext uri="{FF2B5EF4-FFF2-40B4-BE49-F238E27FC236}">
-                <a16:creationId xmlns:a16="http://schemas.microsoft.com/office/drawing/2014/main" id="{D3F7B710-8511-40E0-993E-6FD1CD1A7E46}"/>
-              </a:ext>
-            </a:extLst>
-          </p:cNvPr>
-          <p:cNvSpPr>
-            <a:spLocks noGrp="1"/>
-          </p:cNvSpPr>
-          <p:nvPr>
-            <p:ph type="title"/>
-          </p:nvPr>
-        </p:nvSpPr>
-        <p:spPr>
-          <a:xfrm>
-            <a:off x="913774" y="252757"/>
-            <a:ext cx="10364451" cy="1200123"/>
-          </a:xfrm>
-        </p:spPr>
-        <p:txBody>
-          <a:bodyPr/>
-          <a:lstStyle/>
-          <a:p>
-            <a:r>
-              <a:rPr lang="en-US" b="1" dirty="0"/>
-              <a:t>Neural network: Multi-layer Perceptron (MLP)</a:t>
-            </a:r>
-            <a:endParaRPr lang="en-US" dirty="0"/>
-          </a:p>
-        </p:txBody>
-      </p:sp>
-      <p:pic>
-        <p:nvPicPr>
-          <p:cNvPr id="5" name="Content Placeholder 4" descr="A close up of a map&#10;&#10;Description automatically generated">
-            <a:extLst>
-              <a:ext uri="{FF2B5EF4-FFF2-40B4-BE49-F238E27FC236}">
-                <a16:creationId xmlns:a16="http://schemas.microsoft.com/office/drawing/2014/main" id="{202BEC2A-E42B-43CE-81D6-DDDDB15D4420}"/>
-              </a:ext>
-            </a:extLst>
-          </p:cNvPr>
-          <p:cNvPicPr>
-            <a:picLocks noGrp="1" noChangeAspect="1"/>
-          </p:cNvPicPr>
-          <p:nvPr>
-            <p:ph idx="1"/>
-          </p:nvPr>
-        </p:nvPicPr>
-        <p:blipFill>
-          <a:blip r:embed="rId2">
-            <a:extLst>
-              <a:ext uri="{28A0092B-C50C-407E-A947-70E740481C1C}">
-                <a14:useLocalDpi xmlns:a14="http://schemas.microsoft.com/office/drawing/2010/main" val="0"/>
-              </a:ext>
-            </a:extLst>
-          </a:blip>
-          <a:stretch>
-            <a:fillRect/>
-          </a:stretch>
-        </p:blipFill>
-        <p:spPr>
-          <a:xfrm>
-            <a:off x="7498080" y="1198881"/>
-            <a:ext cx="4693920" cy="5659120"/>
-          </a:xfrm>
-        </p:spPr>
-      </p:pic>
-      <p:sp>
-        <p:nvSpPr>
-          <p:cNvPr id="6" name="Content Placeholder 2">
-            <a:extLst>
-              <a:ext uri="{FF2B5EF4-FFF2-40B4-BE49-F238E27FC236}">
-                <a16:creationId xmlns:a16="http://schemas.microsoft.com/office/drawing/2014/main" id="{DD1EF38F-C732-48B5-944C-361F58622C54}"/>
-              </a:ext>
-            </a:extLst>
-          </p:cNvPr>
-          <p:cNvSpPr txBox="1">
-            <a:spLocks/>
-          </p:cNvSpPr>
-          <p:nvPr/>
-        </p:nvSpPr>
-        <p:spPr>
-          <a:xfrm>
-            <a:off x="162560" y="1452881"/>
-            <a:ext cx="7335519" cy="5273040"/>
-          </a:xfrm>
-          <a:prstGeom prst="rect">
-            <a:avLst/>
-          </a:prstGeom>
-        </p:spPr>
-        <p:txBody>
-          <a:bodyPr vert="horz" lIns="91440" tIns="45720" rIns="91440" bIns="45720" rtlCol="0">
-            <a:normAutofit/>
-          </a:bodyPr>
-          <a:lstStyle>
-            <a:lvl1pPr marL="228600" indent="-228600" algn="l" defTabSz="914400" rtl="0" eaLnBrk="1" latinLnBrk="0" hangingPunct="1">
-              <a:lnSpc>
-                <a:spcPct val="120000"/>
-              </a:lnSpc>
-              <a:spcBef>
-                <a:spcPts val="1000"/>
-              </a:spcBef>
-              <a:buClr>
-                <a:schemeClr val="tx1"/>
-              </a:buClr>
-              <a:buFont typeface="Arial" panose="020B0604020202020204" pitchFamily="34" charset="0"/>
-              <a:buChar char="•"/>
-              <a:defRPr sz="2000" kern="1200" cap="all" baseline="0">
-                <a:solidFill>
-                  <a:schemeClr val="tx1"/>
-                </a:solidFill>
-                <a:effectLst/>
-                <a:latin typeface="+mn-lt"/>
-                <a:ea typeface="+mn-ea"/>
-                <a:cs typeface="+mn-cs"/>
-              </a:defRPr>
-            </a:lvl1pPr>
-            <a:lvl2pPr marL="685800" indent="-228600" algn="l" defTabSz="914400" rtl="0" eaLnBrk="1" latinLnBrk="0" hangingPunct="1">
-              <a:lnSpc>
-                <a:spcPct val="120000"/>
-              </a:lnSpc>
-              <a:spcBef>
-                <a:spcPts val="500"/>
-              </a:spcBef>
-              <a:buClr>
-                <a:schemeClr val="tx1"/>
-              </a:buClr>
-              <a:buFont typeface="Arial" panose="020B0604020202020204" pitchFamily="34" charset="0"/>
-              <a:buChar char="•"/>
-              <a:defRPr sz="1800" kern="1200" cap="all" baseline="0">
-                <a:solidFill>
-                  <a:schemeClr val="tx1"/>
-                </a:solidFill>
-                <a:effectLst/>
-                <a:latin typeface="+mn-lt"/>
-                <a:ea typeface="+mn-ea"/>
-                <a:cs typeface="+mn-cs"/>
-              </a:defRPr>
-            </a:lvl2pPr>
-            <a:lvl3pPr marL="1143000" indent="-228600" algn="l" defTabSz="914400" rtl="0" eaLnBrk="1" latinLnBrk="0" hangingPunct="1">
-              <a:lnSpc>
-                <a:spcPct val="120000"/>
-              </a:lnSpc>
-              <a:spcBef>
-                <a:spcPts val="500"/>
-              </a:spcBef>
-              <a:buClr>
-                <a:schemeClr val="tx1"/>
-              </a:buClr>
-              <a:buFont typeface="Arial" panose="020B0604020202020204" pitchFamily="34" charset="0"/>
-              <a:buChar char="•"/>
-              <a:defRPr sz="1600" kern="1200" cap="all" baseline="0">
-                <a:solidFill>
-                  <a:schemeClr val="tx1"/>
-                </a:solidFill>
-                <a:effectLst/>
-                <a:latin typeface="+mn-lt"/>
-                <a:ea typeface="+mn-ea"/>
-                <a:cs typeface="+mn-cs"/>
-              </a:defRPr>
-            </a:lvl3pPr>
-            <a:lvl4pPr marL="1600200" indent="-228600" algn="l" defTabSz="914400" rtl="0" eaLnBrk="1" latinLnBrk="0" hangingPunct="1">
-              <a:lnSpc>
-                <a:spcPct val="120000"/>
-              </a:lnSpc>
-              <a:spcBef>
-                <a:spcPts val="500"/>
-              </a:spcBef>
-              <a:buClr>
-                <a:schemeClr val="tx1"/>
-              </a:buClr>
-              <a:buFont typeface="Arial" panose="020B0604020202020204" pitchFamily="34" charset="0"/>
-              <a:buChar char="•"/>
-              <a:defRPr sz="1400" kern="1200" cap="all" baseline="0">
-                <a:solidFill>
-                  <a:schemeClr val="tx1"/>
-                </a:solidFill>
-                <a:effectLst/>
-                <a:latin typeface="+mn-lt"/>
-                <a:ea typeface="+mn-ea"/>
-                <a:cs typeface="+mn-cs"/>
-              </a:defRPr>
-            </a:lvl4pPr>
-            <a:lvl5pPr marL="2057400" indent="-228600" algn="l" defTabSz="914400" rtl="0" eaLnBrk="1" latinLnBrk="0" hangingPunct="1">
-              <a:lnSpc>
-                <a:spcPct val="120000"/>
-              </a:lnSpc>
-              <a:spcBef>
-                <a:spcPts val="500"/>
-              </a:spcBef>
-              <a:buClr>
-                <a:schemeClr val="tx1"/>
-              </a:buClr>
-              <a:buFont typeface="Arial" panose="020B0604020202020204" pitchFamily="34" charset="0"/>
-              <a:buChar char="•"/>
-              <a:defRPr sz="1400" kern="1200" cap="all" baseline="0">
-                <a:solidFill>
-                  <a:schemeClr val="tx1"/>
-                </a:solidFill>
-                <a:effectLst/>
-                <a:latin typeface="+mn-lt"/>
-                <a:ea typeface="+mn-ea"/>
-                <a:cs typeface="+mn-cs"/>
-              </a:defRPr>
-            </a:lvl5pPr>
-            <a:lvl6pPr marL="2514600" indent="-228600" algn="l" defTabSz="914400" rtl="0" eaLnBrk="1" latinLnBrk="0" hangingPunct="1">
-              <a:lnSpc>
-                <a:spcPct val="120000"/>
-              </a:lnSpc>
-              <a:spcBef>
-                <a:spcPts val="500"/>
-              </a:spcBef>
-              <a:buClr>
-                <a:schemeClr val="tx1"/>
-              </a:buClr>
-              <a:buFont typeface="Arial" panose="020B0604020202020204" pitchFamily="34" charset="0"/>
-              <a:buChar char="•"/>
-              <a:defRPr sz="1400" kern="1200" cap="all" baseline="0">
-                <a:solidFill>
-                  <a:schemeClr val="tx1"/>
-                </a:solidFill>
-                <a:effectLst/>
-                <a:latin typeface="+mn-lt"/>
-                <a:ea typeface="+mn-ea"/>
-                <a:cs typeface="+mn-cs"/>
-              </a:defRPr>
-            </a:lvl6pPr>
-            <a:lvl7pPr marL="2971800" indent="-228600" algn="l" defTabSz="914400" rtl="0" eaLnBrk="1" latinLnBrk="0" hangingPunct="1">
-              <a:lnSpc>
-                <a:spcPct val="120000"/>
-              </a:lnSpc>
-              <a:spcBef>
-                <a:spcPts val="500"/>
-              </a:spcBef>
-              <a:buClr>
-                <a:schemeClr val="tx1"/>
-              </a:buClr>
-              <a:buFont typeface="Arial" panose="020B0604020202020204" pitchFamily="34" charset="0"/>
-              <a:buChar char="•"/>
-              <a:defRPr sz="1400" kern="1200" cap="all" baseline="0">
-                <a:solidFill>
-                  <a:schemeClr val="tx1"/>
-                </a:solidFill>
-                <a:effectLst/>
-                <a:latin typeface="+mn-lt"/>
-                <a:ea typeface="+mn-ea"/>
-                <a:cs typeface="+mn-cs"/>
-              </a:defRPr>
-            </a:lvl7pPr>
-            <a:lvl8pPr marL="3429000" indent="-228600" algn="l" defTabSz="914400" rtl="0" eaLnBrk="1" latinLnBrk="0" hangingPunct="1">
-              <a:lnSpc>
-                <a:spcPct val="120000"/>
-              </a:lnSpc>
-              <a:spcBef>
-                <a:spcPts val="500"/>
-              </a:spcBef>
-              <a:buClr>
-                <a:schemeClr val="tx1"/>
-              </a:buClr>
-              <a:buFont typeface="Arial" panose="020B0604020202020204" pitchFamily="34" charset="0"/>
-              <a:buChar char="•"/>
-              <a:defRPr sz="1400" kern="1200" cap="all" baseline="0">
-                <a:solidFill>
-                  <a:schemeClr val="tx1"/>
-                </a:solidFill>
-                <a:effectLst/>
-                <a:latin typeface="+mn-lt"/>
-                <a:ea typeface="+mn-ea"/>
-                <a:cs typeface="+mn-cs"/>
-              </a:defRPr>
-            </a:lvl8pPr>
-            <a:lvl9pPr marL="3886200" indent="-228600" algn="l" defTabSz="914400" rtl="0" eaLnBrk="1" latinLnBrk="0" hangingPunct="1">
-              <a:lnSpc>
-                <a:spcPct val="120000"/>
-              </a:lnSpc>
-              <a:spcBef>
-                <a:spcPts val="500"/>
-              </a:spcBef>
-              <a:buClr>
-                <a:schemeClr val="tx1"/>
-              </a:buClr>
-              <a:buFont typeface="Arial" panose="020B0604020202020204" pitchFamily="34" charset="0"/>
-              <a:buChar char="•"/>
-              <a:defRPr sz="1400" kern="1200" cap="all" baseline="0">
-                <a:solidFill>
-                  <a:schemeClr val="tx1"/>
-                </a:solidFill>
-                <a:effectLst/>
-                <a:latin typeface="+mn-lt"/>
-                <a:ea typeface="+mn-ea"/>
-                <a:cs typeface="+mn-cs"/>
-              </a:defRPr>
-            </a:lvl9pPr>
-          </a:lstStyle>
-          <a:p>
-            <a:r>
-              <a:rPr lang="en-US" dirty="0"/>
-              <a:t>The leftmost layer, known as the input layer</a:t>
-            </a:r>
-          </a:p>
-          <a:p>
-            <a:pPr lvl="1"/>
-            <a:r>
-              <a:rPr lang="en-US" dirty="0"/>
-              <a:t> consists of a set of neurons {xi|x1,x2,...,</a:t>
-            </a:r>
-            <a:r>
-              <a:rPr lang="en-US" dirty="0" err="1"/>
-              <a:t>xm</a:t>
-            </a:r>
-            <a:r>
-              <a:rPr lang="en-US" dirty="0"/>
-              <a:t>} representing the input features. </a:t>
-            </a:r>
-          </a:p>
-          <a:p>
-            <a:pPr lvl="1"/>
-            <a:endParaRPr lang="en-US" dirty="0"/>
-          </a:p>
-          <a:p>
-            <a:r>
-              <a:rPr lang="en-US" dirty="0"/>
-              <a:t>Each neuron in the hidden layer transforms the values from the previous layer with a weighted linear summation w1x1+w2x2+...+</a:t>
-            </a:r>
-            <a:r>
-              <a:rPr lang="en-US" dirty="0" err="1"/>
-              <a:t>wmxm</a:t>
-            </a:r>
-            <a:r>
-              <a:rPr lang="en-US" dirty="0"/>
-              <a:t>, </a:t>
-            </a:r>
-          </a:p>
-          <a:p>
-            <a:r>
-              <a:rPr lang="en-US" dirty="0"/>
-              <a:t>followed by a non-linear activation function g(⋅):R→R - like the hyperbolic tan function. </a:t>
-            </a:r>
-          </a:p>
-          <a:p>
-            <a:r>
-              <a:rPr lang="en-US" dirty="0"/>
-              <a:t>The output layer receives the values from the last hidden layer and transforms them into output values.</a:t>
-            </a:r>
-          </a:p>
-        </p:txBody>
-      </p:sp>
-    </p:spTree>
-    <p:extLst>
-      <p:ext uri="{BB962C8B-B14F-4D97-AF65-F5344CB8AC3E}">
-        <p14:creationId xmlns:p14="http://schemas.microsoft.com/office/powerpoint/2010/main" val="2501316165"/>
-      </p:ext>
-    </p:extLst>
-  </p:cSld>
-  <p:clrMapOvr>
-    <a:masterClrMapping/>
-  </p:clrMapOvr>
-</p:sld>
-</file>
-
-<file path=ppt/slides/slide7.xml><?xml version="1.0" encoding="utf-8"?>
-<p:sld xmlns:a="http://schemas.openxmlformats.org/drawingml/2006/main" xmlns:r="http://schemas.openxmlformats.org/officeDocument/2006/relationships" xmlns:p="http://schemas.openxmlformats.org/presentationml/2006/main">
-  <p:cSld>
-    <p:spTree>
-      <p:nvGrpSpPr>
-        <p:cNvPr id="1" name=""/>
-        <p:cNvGrpSpPr/>
-        <p:nvPr/>
-      </p:nvGrpSpPr>
-      <p:grpSpPr>
-        <a:xfrm>
-          <a:off x="0" y="0"/>
-          <a:ext cx="0" cy="0"/>
-          <a:chOff x="0" y="0"/>
-          <a:chExt cx="0" cy="0"/>
-        </a:xfrm>
-      </p:grpSpPr>
-      <p:sp>
-        <p:nvSpPr>
-          <p:cNvPr id="2" name="Title 1">
-            <a:extLst>
-              <a:ext uri="{FF2B5EF4-FFF2-40B4-BE49-F238E27FC236}">
-                <a16:creationId xmlns:a16="http://schemas.microsoft.com/office/drawing/2014/main" id="{7C5F784A-AB6F-46EC-8AD6-DC9A67A9A907}"/>
-              </a:ext>
-            </a:extLst>
-          </p:cNvPr>
-          <p:cNvSpPr>
-            <a:spLocks noGrp="1"/>
-          </p:cNvSpPr>
-          <p:nvPr>
-            <p:ph type="title"/>
-          </p:nvPr>
-        </p:nvSpPr>
-        <p:spPr>
-          <a:xfrm>
-            <a:off x="904240" y="132080"/>
-            <a:ext cx="10364451" cy="820421"/>
-          </a:xfrm>
-        </p:spPr>
-        <p:txBody>
-          <a:bodyPr/>
-          <a:lstStyle/>
-          <a:p>
-            <a:r>
-              <a:rPr lang="en-US" b="1" dirty="0"/>
-              <a:t>K-Nearest Neighbors (KNN)</a:t>
-            </a:r>
-          </a:p>
-        </p:txBody>
-      </p:sp>
-      <p:sp>
-        <p:nvSpPr>
-          <p:cNvPr id="3" name="Content Placeholder 2">
-            <a:extLst>
-              <a:ext uri="{FF2B5EF4-FFF2-40B4-BE49-F238E27FC236}">
-                <a16:creationId xmlns:a16="http://schemas.microsoft.com/office/drawing/2014/main" id="{F411D1C1-984B-4206-9D00-43F6FCDF932C}"/>
-              </a:ext>
-            </a:extLst>
-          </p:cNvPr>
-          <p:cNvSpPr>
-            <a:spLocks noGrp="1"/>
-          </p:cNvSpPr>
-          <p:nvPr>
-            <p:ph idx="1"/>
-          </p:nvPr>
-        </p:nvSpPr>
-        <p:spPr>
-          <a:xfrm>
-            <a:off x="0" y="952500"/>
-            <a:ext cx="6868161" cy="5905499"/>
-          </a:xfrm>
-        </p:spPr>
-        <p:txBody>
-          <a:bodyPr>
-            <a:normAutofit/>
-          </a:bodyPr>
-          <a:lstStyle/>
-          <a:p>
-            <a:pPr>
-              <a:lnSpc>
-                <a:spcPct val="150000"/>
-              </a:lnSpc>
-              <a:spcBef>
-                <a:spcPts val="0"/>
-              </a:spcBef>
-              <a:buFont typeface="Wingdings" panose="05000000000000000000" pitchFamily="2" charset="2"/>
-              <a:buChar char="è"/>
-            </a:pPr>
-            <a:r>
-              <a:rPr lang="en-US" i="1" dirty="0"/>
-              <a:t>is a </a:t>
-            </a:r>
-            <a:r>
-              <a:rPr lang="en-US" b="1" i="1" dirty="0"/>
-              <a:t>non-parametric</a:t>
-            </a:r>
-            <a:r>
-              <a:rPr lang="en-US" i="1" dirty="0"/>
-              <a:t>, </a:t>
-            </a:r>
-            <a:r>
-              <a:rPr lang="en-US" b="1" i="1" dirty="0"/>
-              <a:t>lazy learning</a:t>
-            </a:r>
-            <a:r>
-              <a:rPr lang="en-US" i="1" dirty="0"/>
-              <a:t> method used for classification and regression. </a:t>
-            </a:r>
-          </a:p>
-          <a:p>
-            <a:pPr lvl="1">
-              <a:lnSpc>
-                <a:spcPct val="150000"/>
-              </a:lnSpc>
-              <a:spcBef>
-                <a:spcPts val="0"/>
-              </a:spcBef>
-              <a:buFont typeface="Wingdings" panose="05000000000000000000" pitchFamily="2" charset="2"/>
-              <a:buChar char="Ø"/>
-            </a:pPr>
-            <a:r>
-              <a:rPr lang="en-US" sz="1700" b="1" dirty="0"/>
-              <a:t>non-parametric</a:t>
-            </a:r>
-            <a:r>
-              <a:rPr lang="en-US" sz="1700" dirty="0"/>
-              <a:t>, it means that it does not make any assumption of the data distribution</a:t>
-            </a:r>
-          </a:p>
-          <a:p>
-            <a:pPr lvl="1">
-              <a:lnSpc>
-                <a:spcPct val="150000"/>
-              </a:lnSpc>
-              <a:spcBef>
-                <a:spcPts val="0"/>
-              </a:spcBef>
-              <a:buFont typeface="Wingdings" panose="05000000000000000000" pitchFamily="2" charset="2"/>
-              <a:buChar char="Ø"/>
-            </a:pPr>
-            <a:r>
-              <a:rPr lang="en-US" sz="1700" dirty="0"/>
-              <a:t> </a:t>
-            </a:r>
-            <a:r>
-              <a:rPr lang="en-US" sz="1700" b="1" dirty="0"/>
-              <a:t>lazy learning</a:t>
-            </a:r>
-            <a:r>
-              <a:rPr lang="en-US" sz="1700" dirty="0"/>
-              <a:t> is a learning method in which generalization of the training data is delayed until a query is made to the system. In other words, there is no explicit training stage, or it is very minimal, which also means that training is very fast in KNN.</a:t>
-            </a:r>
-            <a:endParaRPr lang="en-US" sz="1700" i="1" dirty="0"/>
-          </a:p>
-          <a:p>
-            <a:pPr>
-              <a:lnSpc>
-                <a:spcPct val="150000"/>
-              </a:lnSpc>
-              <a:spcBef>
-                <a:spcPts val="0"/>
-              </a:spcBef>
-              <a:buFont typeface="Wingdings" panose="05000000000000000000" pitchFamily="2" charset="2"/>
-              <a:buChar char="è"/>
-            </a:pPr>
-            <a:r>
-              <a:rPr lang="en-US" i="1" dirty="0" err="1"/>
-              <a:t>Toutput</a:t>
-            </a:r>
-            <a:r>
-              <a:rPr lang="en-US" i="1" dirty="0"/>
-              <a:t> </a:t>
-            </a:r>
-          </a:p>
-          <a:p>
-            <a:pPr lvl="1">
-              <a:lnSpc>
-                <a:spcPct val="150000"/>
-              </a:lnSpc>
-              <a:spcBef>
-                <a:spcPts val="0"/>
-              </a:spcBef>
-              <a:buFont typeface="Wingdings" panose="05000000000000000000" pitchFamily="2" charset="2"/>
-              <a:buChar char="ü"/>
-            </a:pPr>
-            <a:r>
-              <a:rPr lang="en-US" i="1" dirty="0"/>
-              <a:t>majority vote (for classification)</a:t>
-            </a:r>
-          </a:p>
-          <a:p>
-            <a:pPr lvl="1">
-              <a:lnSpc>
-                <a:spcPct val="150000"/>
-              </a:lnSpc>
-              <a:spcBef>
-                <a:spcPts val="0"/>
-              </a:spcBef>
-              <a:buFont typeface="Wingdings" panose="05000000000000000000" pitchFamily="2" charset="2"/>
-              <a:buChar char="ü"/>
-            </a:pPr>
-            <a:r>
-              <a:rPr lang="en-US" i="1" dirty="0"/>
-              <a:t>mean (or median, for regression) of the k-nearest neighbors in the feature space</a:t>
-            </a:r>
-            <a:endParaRPr lang="en-US" dirty="0"/>
-          </a:p>
-        </p:txBody>
-      </p:sp>
-      <p:pic>
-        <p:nvPicPr>
-          <p:cNvPr id="5" name="Picture 4" descr="A close up of a map&#10;&#10;Description automatically generated">
-            <a:extLst>
-              <a:ext uri="{FF2B5EF4-FFF2-40B4-BE49-F238E27FC236}">
-                <a16:creationId xmlns:a16="http://schemas.microsoft.com/office/drawing/2014/main" id="{8876F254-40D0-41CB-8EE9-0E82CE01C3FE}"/>
-              </a:ext>
-            </a:extLst>
-          </p:cNvPr>
-          <p:cNvPicPr>
-            <a:picLocks noChangeAspect="1"/>
-          </p:cNvPicPr>
-          <p:nvPr/>
-        </p:nvPicPr>
-        <p:blipFill>
-          <a:blip r:embed="rId2">
-            <a:extLst>
-              <a:ext uri="{28A0092B-C50C-407E-A947-70E740481C1C}">
-                <a14:useLocalDpi xmlns:a14="http://schemas.microsoft.com/office/drawing/2010/main" val="0"/>
-              </a:ext>
-            </a:extLst>
-          </a:blip>
-          <a:stretch>
-            <a:fillRect/>
-          </a:stretch>
-        </p:blipFill>
-        <p:spPr>
-          <a:xfrm>
-            <a:off x="6772275" y="952501"/>
-            <a:ext cx="5419725" cy="5773420"/>
-          </a:xfrm>
-          <a:prstGeom prst="rect">
-            <a:avLst/>
-          </a:prstGeom>
-        </p:spPr>
-      </p:pic>
-    </p:spTree>
-    <p:extLst>
-      <p:ext uri="{BB962C8B-B14F-4D97-AF65-F5344CB8AC3E}">
-        <p14:creationId xmlns:p14="http://schemas.microsoft.com/office/powerpoint/2010/main" val="3609695604"/>
-      </p:ext>
-    </p:extLst>
-  </p:cSld>
-  <p:clrMapOvr>
-    <a:masterClrMapping/>
-  </p:clrMapOvr>
-</p:sld>
-</file>
-
-<file path=ppt/slides/slide8.xml><?xml version="1.0" encoding="utf-8"?>
-<p:sld xmlns:a="http://schemas.openxmlformats.org/drawingml/2006/main" xmlns:r="http://schemas.openxmlformats.org/officeDocument/2006/relationships" xmlns:p="http://schemas.openxmlformats.org/presentationml/2006/main">
-  <p:cSld>
-    <p:spTree>
-      <p:nvGrpSpPr>
-        <p:cNvPr id="1" name=""/>
-        <p:cNvGrpSpPr/>
-        <p:nvPr/>
-      </p:nvGrpSpPr>
-      <p:grpSpPr>
-        <a:xfrm>
-          <a:off x="0" y="0"/>
-          <a:ext cx="0" cy="0"/>
-          <a:chOff x="0" y="0"/>
-          <a:chExt cx="0" cy="0"/>
-        </a:xfrm>
-      </p:grpSpPr>
-      <p:sp>
-        <p:nvSpPr>
-          <p:cNvPr id="2" name="Title 1">
-            <a:extLst>
-              <a:ext uri="{FF2B5EF4-FFF2-40B4-BE49-F238E27FC236}">
-                <a16:creationId xmlns:a16="http://schemas.microsoft.com/office/drawing/2014/main" id="{8DB973C2-14D8-42FC-BF66-6200C85E673D}"/>
-              </a:ext>
-            </a:extLst>
-          </p:cNvPr>
-          <p:cNvSpPr>
-            <a:spLocks noGrp="1"/>
-          </p:cNvSpPr>
-          <p:nvPr>
-            <p:ph type="title"/>
-          </p:nvPr>
-        </p:nvSpPr>
-        <p:spPr/>
-        <p:txBody>
-          <a:bodyPr/>
-          <a:lstStyle/>
-          <a:p>
-            <a:endParaRPr lang="en-US"/>
-          </a:p>
-        </p:txBody>
-      </p:sp>
-      <p:sp>
-        <p:nvSpPr>
-          <p:cNvPr id="3" name="Content Placeholder 2">
-            <a:extLst>
-              <a:ext uri="{FF2B5EF4-FFF2-40B4-BE49-F238E27FC236}">
-                <a16:creationId xmlns:a16="http://schemas.microsoft.com/office/drawing/2014/main" id="{BF0E5C09-A5B1-4E4D-8B53-170DF4D74F1A}"/>
-              </a:ext>
-            </a:extLst>
-          </p:cNvPr>
-          <p:cNvSpPr>
-            <a:spLocks noGrp="1"/>
-          </p:cNvSpPr>
-          <p:nvPr>
-            <p:ph idx="1"/>
-          </p:nvPr>
-        </p:nvSpPr>
-        <p:spPr/>
-        <p:txBody>
-          <a:bodyPr/>
-          <a:lstStyle/>
-          <a:p>
-            <a:endParaRPr lang="en-US"/>
-          </a:p>
-        </p:txBody>
-      </p:sp>
-    </p:spTree>
-    <p:extLst>
-      <p:ext uri="{BB962C8B-B14F-4D97-AF65-F5344CB8AC3E}">
-        <p14:creationId xmlns:p14="http://schemas.microsoft.com/office/powerpoint/2010/main" val="820134078"/>
-      </p:ext>
-    </p:extLst>
-  </p:cSld>
-  <p:clrMapOvr>
-    <a:masterClrMapping/>
-  </p:clrMapOvr>
-</p:sld>
-</file>
-
-<file path=ppt/slides/slide9.xml><?xml version="1.0" encoding="utf-8"?>
-<p:sld xmlns:a="http://schemas.openxmlformats.org/drawingml/2006/main" xmlns:r="http://schemas.openxmlformats.org/officeDocument/2006/relationships" xmlns:p="http://schemas.openxmlformats.org/presentationml/2006/main">
-  <p:cSld>
-    <p:spTree>
-      <p:nvGrpSpPr>
-        <p:cNvPr id="1" name=""/>
-        <p:cNvGrpSpPr/>
-        <p:nvPr/>
-      </p:nvGrpSpPr>
-      <p:grpSpPr>
-        <a:xfrm>
-          <a:off x="0" y="0"/>
-          <a:ext cx="0" cy="0"/>
-          <a:chOff x="0" y="0"/>
-          <a:chExt cx="0" cy="0"/>
-        </a:xfrm>
-      </p:grpSpPr>
-      <p:sp>
-        <p:nvSpPr>
-          <p:cNvPr id="2" name="Title 1">
-            <a:extLst>
-              <a:ext uri="{FF2B5EF4-FFF2-40B4-BE49-F238E27FC236}">
-                <a16:creationId xmlns:a16="http://schemas.microsoft.com/office/drawing/2014/main" id="{214CC171-BCF1-4550-BD77-7B0A0917C103}"/>
-              </a:ext>
-            </a:extLst>
-          </p:cNvPr>
-          <p:cNvSpPr>
-            <a:spLocks noGrp="1"/>
-          </p:cNvSpPr>
-          <p:nvPr>
-            <p:ph type="title"/>
-          </p:nvPr>
-        </p:nvSpPr>
-        <p:spPr>
-          <a:xfrm>
-            <a:off x="818525" y="1476375"/>
-            <a:ext cx="10364451" cy="2414719"/>
-          </a:xfrm>
-        </p:spPr>
-        <p:txBody>
-          <a:bodyPr>
-            <a:normAutofit/>
-          </a:bodyPr>
-          <a:lstStyle/>
-          <a:p>
-            <a:r>
-              <a:rPr lang="en-US" sz="8000" dirty="0"/>
-              <a:t>If we have more time</a:t>
-            </a:r>
-          </a:p>
-        </p:txBody>
-      </p:sp>
-    </p:spTree>
-    <p:extLst>
-      <p:ext uri="{BB962C8B-B14F-4D97-AF65-F5344CB8AC3E}">
-        <p14:creationId xmlns:p14="http://schemas.microsoft.com/office/powerpoint/2010/main" val="2090234231"/>
       </p:ext>
     </p:extLst>
   </p:cSld>

</xml_diff>

<commit_message>
upload reorganized folders and add readme
</commit_message>
<xml_diff>
--- a/flu_indicator/data/resources/Presentation1.pptx
+++ b/flu_indicator/data/resources/Presentation1.pptx
@@ -5,11 +5,13 @@
     <p:sldMasterId id="2147483739" r:id="rId1"/>
   </p:sldMasterIdLst>
   <p:sldIdLst>
-    <p:sldId id="266" r:id="rId2"/>
-    <p:sldId id="267" r:id="rId3"/>
-    <p:sldId id="269" r:id="rId4"/>
-    <p:sldId id="268" r:id="rId5"/>
-    <p:sldId id="261" r:id="rId6"/>
+    <p:sldId id="273" r:id="rId2"/>
+    <p:sldId id="275" r:id="rId3"/>
+    <p:sldId id="277" r:id="rId4"/>
+    <p:sldId id="267" r:id="rId5"/>
+    <p:sldId id="269" r:id="rId6"/>
+    <p:sldId id="268" r:id="rId7"/>
+    <p:sldId id="261" r:id="rId8"/>
   </p:sldIdLst>
   <p:sldSz cx="12192000" cy="6858000"/>
   <p:notesSz cx="6858000" cy="9144000"/>
@@ -287,7 +289,7 @@
           <a:p>
             <a:fld id="{A1859F04-D51F-4ABC-AD89-DF326765EE81}" type="datetimeFigureOut">
               <a:rPr lang="en-US" smtClean="0"/>
-              <a:t>8/5/2019</a:t>
+              <a:t>8/6/2019</a:t>
             </a:fld>
             <a:endParaRPr lang="en-US"/>
           </a:p>
@@ -602,7 +604,7 @@
           <a:p>
             <a:fld id="{A1859F04-D51F-4ABC-AD89-DF326765EE81}" type="datetimeFigureOut">
               <a:rPr lang="en-US" smtClean="0"/>
-              <a:t>8/5/2019</a:t>
+              <a:t>8/6/2019</a:t>
             </a:fld>
             <a:endParaRPr lang="en-US"/>
           </a:p>
@@ -824,7 +826,7 @@
           <a:p>
             <a:fld id="{A1859F04-D51F-4ABC-AD89-DF326765EE81}" type="datetimeFigureOut">
               <a:rPr lang="en-US" smtClean="0"/>
-              <a:t>8/5/2019</a:t>
+              <a:t>8/6/2019</a:t>
             </a:fld>
             <a:endParaRPr lang="en-US"/>
           </a:p>
@@ -1115,7 +1117,7 @@
           <a:p>
             <a:fld id="{A1859F04-D51F-4ABC-AD89-DF326765EE81}" type="datetimeFigureOut">
               <a:rPr lang="en-US" smtClean="0"/>
-              <a:t>8/5/2019</a:t>
+              <a:t>8/6/2019</a:t>
             </a:fld>
             <a:endParaRPr lang="en-US"/>
           </a:p>
@@ -1569,7 +1571,7 @@
           <a:p>
             <a:fld id="{A1859F04-D51F-4ABC-AD89-DF326765EE81}" type="datetimeFigureOut">
               <a:rPr lang="en-US" smtClean="0"/>
-              <a:t>8/5/2019</a:t>
+              <a:t>8/6/2019</a:t>
             </a:fld>
             <a:endParaRPr lang="en-US"/>
           </a:p>
@@ -2145,7 +2147,7 @@
           <a:p>
             <a:fld id="{A1859F04-D51F-4ABC-AD89-DF326765EE81}" type="datetimeFigureOut">
               <a:rPr lang="en-US" smtClean="0"/>
-              <a:t>8/5/2019</a:t>
+              <a:t>8/6/2019</a:t>
             </a:fld>
             <a:endParaRPr lang="en-US"/>
           </a:p>
@@ -3006,7 +3008,7 @@
           <a:p>
             <a:fld id="{A1859F04-D51F-4ABC-AD89-DF326765EE81}" type="datetimeFigureOut">
               <a:rPr lang="en-US" smtClean="0"/>
-              <a:t>8/5/2019</a:t>
+              <a:t>8/6/2019</a:t>
             </a:fld>
             <a:endParaRPr lang="en-US"/>
           </a:p>
@@ -3211,7 +3213,7 @@
           <a:p>
             <a:fld id="{A1859F04-D51F-4ABC-AD89-DF326765EE81}" type="datetimeFigureOut">
               <a:rPr lang="en-US" smtClean="0"/>
-              <a:t>8/5/2019</a:t>
+              <a:t>8/6/2019</a:t>
             </a:fld>
             <a:endParaRPr lang="en-US"/>
           </a:p>
@@ -3425,7 +3427,7 @@
           <a:p>
             <a:fld id="{A1859F04-D51F-4ABC-AD89-DF326765EE81}" type="datetimeFigureOut">
               <a:rPr lang="en-US" smtClean="0"/>
-              <a:t>8/5/2019</a:t>
+              <a:t>8/6/2019</a:t>
             </a:fld>
             <a:endParaRPr lang="en-US"/>
           </a:p>
@@ -3595,7 +3597,7 @@
           <a:p>
             <a:fld id="{A1859F04-D51F-4ABC-AD89-DF326765EE81}" type="datetimeFigureOut">
               <a:rPr lang="en-US" smtClean="0"/>
-              <a:t>8/5/2019</a:t>
+              <a:t>8/6/2019</a:t>
             </a:fld>
             <a:endParaRPr lang="en-US"/>
           </a:p>
@@ -3800,7 +3802,7 @@
           <a:p>
             <a:fld id="{A1859F04-D51F-4ABC-AD89-DF326765EE81}" type="datetimeFigureOut">
               <a:rPr lang="en-US" smtClean="0"/>
-              <a:t>8/5/2019</a:t>
+              <a:t>8/6/2019</a:t>
             </a:fld>
             <a:endParaRPr lang="en-US"/>
           </a:p>
@@ -4080,7 +4082,7 @@
           <a:p>
             <a:fld id="{A1859F04-D51F-4ABC-AD89-DF326765EE81}" type="datetimeFigureOut">
               <a:rPr lang="en-US" smtClean="0"/>
-              <a:t>8/5/2019</a:t>
+              <a:t>8/6/2019</a:t>
             </a:fld>
             <a:endParaRPr lang="en-US"/>
           </a:p>
@@ -4347,7 +4349,7 @@
           <a:p>
             <a:fld id="{A1859F04-D51F-4ABC-AD89-DF326765EE81}" type="datetimeFigureOut">
               <a:rPr lang="en-US" smtClean="0"/>
-              <a:t>8/5/2019</a:t>
+              <a:t>8/6/2019</a:t>
             </a:fld>
             <a:endParaRPr lang="en-US"/>
           </a:p>
@@ -4762,7 +4764,7 @@
           <a:p>
             <a:fld id="{A1859F04-D51F-4ABC-AD89-DF326765EE81}" type="datetimeFigureOut">
               <a:rPr lang="en-US" smtClean="0"/>
-              <a:t>8/5/2019</a:t>
+              <a:t>8/6/2019</a:t>
             </a:fld>
             <a:endParaRPr lang="en-US"/>
           </a:p>
@@ -4910,7 +4912,7 @@
           <a:p>
             <a:fld id="{A1859F04-D51F-4ABC-AD89-DF326765EE81}" type="datetimeFigureOut">
               <a:rPr lang="en-US" smtClean="0"/>
-              <a:t>8/5/2019</a:t>
+              <a:t>8/6/2019</a:t>
             </a:fld>
             <a:endParaRPr lang="en-US"/>
           </a:p>
@@ -5035,7 +5037,7 @@
           <a:p>
             <a:fld id="{A1859F04-D51F-4ABC-AD89-DF326765EE81}" type="datetimeFigureOut">
               <a:rPr lang="en-US" smtClean="0"/>
-              <a:t>8/5/2019</a:t>
+              <a:t>8/6/2019</a:t>
             </a:fld>
             <a:endParaRPr lang="en-US"/>
           </a:p>
@@ -5314,7 +5316,7 @@
           <a:p>
             <a:fld id="{A1859F04-D51F-4ABC-AD89-DF326765EE81}" type="datetimeFigureOut">
               <a:rPr lang="en-US" smtClean="0"/>
-              <a:t>8/5/2019</a:t>
+              <a:t>8/6/2019</a:t>
             </a:fld>
             <a:endParaRPr lang="en-US"/>
           </a:p>
@@ -5629,7 +5631,7 @@
           <a:p>
             <a:fld id="{A1859F04-D51F-4ABC-AD89-DF326765EE81}" type="datetimeFigureOut">
               <a:rPr lang="en-US" smtClean="0"/>
-              <a:t>8/5/2019</a:t>
+              <a:t>8/6/2019</a:t>
             </a:fld>
             <a:endParaRPr lang="en-US"/>
           </a:p>
@@ -5882,7 +5884,7 @@
           <a:p>
             <a:fld id="{A1859F04-D51F-4ABC-AD89-DF326765EE81}" type="datetimeFigureOut">
               <a:rPr lang="en-US" smtClean="0"/>
-              <a:t>8/5/2019</a:t>
+              <a:t>8/6/2019</a:t>
             </a:fld>
             <a:endParaRPr lang="en-US"/>
           </a:p>
@@ -6378,7 +6380,7 @@
           <p:cNvPr id="2" name="Title 1">
             <a:extLst>
               <a:ext uri="{FF2B5EF4-FFF2-40B4-BE49-F238E27FC236}">
-                <a16:creationId xmlns:a16="http://schemas.microsoft.com/office/drawing/2014/main" id="{214CC171-BCF1-4550-BD77-7B0A0917C103}"/>
+                <a16:creationId xmlns:a16="http://schemas.microsoft.com/office/drawing/2014/main" id="{F2E536A9-52DC-4A3E-AC42-91E14C9E0ECC}"/>
               </a:ext>
             </a:extLst>
           </p:cNvPr>
@@ -6391,8 +6393,8 @@
         </p:nvSpPr>
         <p:spPr>
           <a:xfrm>
-            <a:off x="818525" y="1476375"/>
-            <a:ext cx="10364451" cy="2414719"/>
+            <a:off x="243840" y="91441"/>
+            <a:ext cx="11856719" cy="782320"/>
           </a:xfrm>
         </p:spPr>
         <p:txBody>
@@ -6402,16 +6404,98 @@
           <a:lstStyle/>
           <a:p>
             <a:r>
-              <a:rPr lang="en-US" sz="8000" dirty="0"/>
-              <a:t>If we have more time</a:t>
-            </a:r>
-          </a:p>
-        </p:txBody>
-      </p:sp>
+              <a:rPr lang="en-US" dirty="0"/>
+              <a:t>Summary STAT</a:t>
+            </a:r>
+          </a:p>
+        </p:txBody>
+      </p:sp>
+      <p:sp>
+        <p:nvSpPr>
+          <p:cNvPr id="3" name="Content Placeholder 2">
+            <a:extLst>
+              <a:ext uri="{FF2B5EF4-FFF2-40B4-BE49-F238E27FC236}">
+                <a16:creationId xmlns:a16="http://schemas.microsoft.com/office/drawing/2014/main" id="{0C97DD61-6FE2-4C32-AFCF-77903194F0B4}"/>
+              </a:ext>
+            </a:extLst>
+          </p:cNvPr>
+          <p:cNvSpPr>
+            <a:spLocks noGrp="1"/>
+          </p:cNvSpPr>
+          <p:nvPr>
+            <p:ph idx="1"/>
+          </p:nvPr>
+        </p:nvSpPr>
+        <p:spPr>
+          <a:xfrm>
+            <a:off x="243840" y="6075680"/>
+            <a:ext cx="11653519" cy="782320"/>
+          </a:xfrm>
+        </p:spPr>
+        <p:txBody>
+          <a:bodyPr>
+            <a:normAutofit lnSpcReduction="10000"/>
+          </a:bodyPr>
+          <a:lstStyle/>
+          <a:p>
+            <a:pPr marL="0" indent="0">
+              <a:buNone/>
+            </a:pPr>
+            <a:r>
+              <a:rPr lang="en-US" dirty="0"/>
+              <a:t>Summary Table 1. </a:t>
+            </a:r>
+            <a:r>
+              <a:rPr lang="en-US" dirty="0" err="1"/>
+              <a:t>r_score</a:t>
+            </a:r>
+            <a:r>
+              <a:rPr lang="en-US" dirty="0"/>
+              <a:t>(R2),  Mean Squared Error(MSE), Mean Absolute Error(MAE) with all 133 features vectors</a:t>
+            </a:r>
+          </a:p>
+        </p:txBody>
+      </p:sp>
+      <p:pic>
+        <p:nvPicPr>
+          <p:cNvPr id="7" name="Picture 6">
+            <a:extLst>
+              <a:ext uri="{FF2B5EF4-FFF2-40B4-BE49-F238E27FC236}">
+                <a16:creationId xmlns:a16="http://schemas.microsoft.com/office/drawing/2014/main" id="{9BB8BBDC-5D43-43D5-8D45-6D56101D4B19}"/>
+              </a:ext>
+            </a:extLst>
+          </p:cNvPr>
+          <p:cNvPicPr>
+            <a:picLocks noChangeAspect="1"/>
+          </p:cNvPicPr>
+          <p:nvPr/>
+        </p:nvPicPr>
+        <p:blipFill>
+          <a:blip r:embed="rId2">
+            <a:extLst>
+              <a:ext uri="{28A0092B-C50C-407E-A947-70E740481C1C}">
+                <a14:useLocalDpi xmlns:a14="http://schemas.microsoft.com/office/drawing/2010/main" val="0"/>
+              </a:ext>
+            </a:extLst>
+          </a:blip>
+          <a:stretch>
+            <a:fillRect/>
+          </a:stretch>
+        </p:blipFill>
+        <p:spPr>
+          <a:xfrm>
+            <a:off x="0" y="782320"/>
+            <a:ext cx="12192000" cy="5201920"/>
+          </a:xfrm>
+          <a:prstGeom prst="rect">
+            <a:avLst/>
+          </a:prstGeom>
+        </p:spPr>
+      </p:pic>
     </p:spTree>
     <p:extLst>
       <p:ext uri="{BB962C8B-B14F-4D97-AF65-F5344CB8AC3E}">
-        <p14:creationId xmlns:p14="http://schemas.microsoft.com/office/powerpoint/2010/main" val="2090234231"/>
+        <p14:creationId xmlns:p14="http://schemas.microsoft.com/office/powerpoint/2010/main" val="235265691"/>
       </p:ext>
     </p:extLst>
   </p:cSld>
@@ -6443,7 +6527,7 @@
           <p:cNvPr id="2" name="Title 1">
             <a:extLst>
               <a:ext uri="{FF2B5EF4-FFF2-40B4-BE49-F238E27FC236}">
-                <a16:creationId xmlns:a16="http://schemas.microsoft.com/office/drawing/2014/main" id="{E55FC3AB-09FE-447A-8E97-B349B7CBA6F0}"/>
+                <a16:creationId xmlns:a16="http://schemas.microsoft.com/office/drawing/2014/main" id="{F2E536A9-52DC-4A3E-AC42-91E14C9E0ECC}"/>
               </a:ext>
             </a:extLst>
           </p:cNvPr>
@@ -6456,19 +6540,19 @@
         </p:nvSpPr>
         <p:spPr>
           <a:xfrm>
-            <a:off x="913774" y="161926"/>
-            <a:ext cx="10364451" cy="552449"/>
+            <a:off x="243840" y="91441"/>
+            <a:ext cx="11856719" cy="782320"/>
           </a:xfrm>
         </p:spPr>
         <p:txBody>
           <a:bodyPr>
-            <a:normAutofit fontScale="90000"/>
+            <a:normAutofit/>
           </a:bodyPr>
           <a:lstStyle/>
           <a:p>
             <a:r>
               <a:rPr lang="en-US" dirty="0"/>
-              <a:t>If we have more time</a:t>
+              <a:t>Summary STAT</a:t>
             </a:r>
           </a:p>
         </p:txBody>
@@ -6478,7 +6562,7 @@
           <p:cNvPr id="3" name="Content Placeholder 2">
             <a:extLst>
               <a:ext uri="{FF2B5EF4-FFF2-40B4-BE49-F238E27FC236}">
-                <a16:creationId xmlns:a16="http://schemas.microsoft.com/office/drawing/2014/main" id="{3248396E-724D-4D5D-8AA1-25F4E050B330}"/>
+                <a16:creationId xmlns:a16="http://schemas.microsoft.com/office/drawing/2014/main" id="{0C97DD61-6FE2-4C32-AFCF-77903194F0B4}"/>
               </a:ext>
             </a:extLst>
           </p:cNvPr>
@@ -6491,51 +6575,357 @@
         </p:nvSpPr>
         <p:spPr>
           <a:xfrm>
-            <a:off x="219074" y="971551"/>
-            <a:ext cx="11725275" cy="5572124"/>
-          </a:xfrm>
-        </p:spPr>
-        <p:txBody>
-          <a:bodyPr/>
+            <a:off x="269240" y="2616199"/>
+            <a:ext cx="11653519" cy="497840"/>
+          </a:xfrm>
+        </p:spPr>
+        <p:txBody>
+          <a:bodyPr>
+            <a:normAutofit/>
+          </a:bodyPr>
           <a:lstStyle/>
           <a:p>
             <a:pPr marL="0" indent="0">
               <a:buNone/>
             </a:pPr>
             <a:r>
-              <a:rPr lang="en-US" sz="6000" dirty="0"/>
-              <a:t>Creating an ensemble learners</a:t>
-            </a:r>
-            <a:endParaRPr lang="en-US" i="1" dirty="0"/>
-          </a:p>
-          <a:p>
-            <a:r>
-              <a:rPr lang="en-US" i="1" dirty="0"/>
-              <a:t>Ensemble models in machine learning combine the decisions from multiple models to improve the overall performance.</a:t>
-            </a:r>
-            <a:r>
               <a:rPr lang="en-US" dirty="0"/>
-              <a:t> </a:t>
-            </a:r>
-          </a:p>
-          <a:p>
+              <a:t>Summary Table 1. </a:t>
+            </a:r>
+            <a:r>
+              <a:rPr lang="en-US" dirty="0" err="1"/>
+              <a:t>R_score</a:t>
+            </a:r>
             <a:r>
               <a:rPr lang="en-US" dirty="0"/>
-              <a:t>Make the learner we have got better</a:t>
-            </a:r>
-          </a:p>
+              <a:t>, MSE, MAE with all 74 features vectors</a:t>
+            </a:r>
+          </a:p>
+        </p:txBody>
+      </p:sp>
+      <p:pic>
+        <p:nvPicPr>
+          <p:cNvPr id="7" name="Picture 6" descr="A picture containing sky&#10;&#10;Description automatically generated">
+            <a:extLst>
+              <a:ext uri="{FF2B5EF4-FFF2-40B4-BE49-F238E27FC236}">
+                <a16:creationId xmlns:a16="http://schemas.microsoft.com/office/drawing/2014/main" id="{FE3575B9-7913-431C-A4AE-21684D6DE513}"/>
+              </a:ext>
+            </a:extLst>
+          </p:cNvPr>
+          <p:cNvPicPr>
+            <a:picLocks noChangeAspect="1"/>
+          </p:cNvPicPr>
+          <p:nvPr/>
+        </p:nvPicPr>
+        <p:blipFill>
+          <a:blip r:embed="rId2">
+            <a:extLst>
+              <a:ext uri="{28A0092B-C50C-407E-A947-70E740481C1C}">
+                <a14:useLocalDpi xmlns:a14="http://schemas.microsoft.com/office/drawing/2010/main" val="0"/>
+              </a:ext>
+            </a:extLst>
+          </a:blip>
+          <a:stretch>
+            <a:fillRect/>
+          </a:stretch>
+        </p:blipFill>
+        <p:spPr>
+          <a:xfrm>
+            <a:off x="243840" y="873761"/>
+            <a:ext cx="11775440" cy="1621179"/>
+          </a:xfrm>
+          <a:prstGeom prst="rect">
+            <a:avLst/>
+          </a:prstGeom>
+        </p:spPr>
+      </p:pic>
+      <p:pic>
+        <p:nvPicPr>
+          <p:cNvPr id="9" name="Picture 8" descr="A screenshot of a cell phone&#10;&#10;Description automatically generated">
+            <a:extLst>
+              <a:ext uri="{FF2B5EF4-FFF2-40B4-BE49-F238E27FC236}">
+                <a16:creationId xmlns:a16="http://schemas.microsoft.com/office/drawing/2014/main" id="{3EB0E414-01D8-4D20-B8CD-62E086C60F69}"/>
+              </a:ext>
+            </a:extLst>
+          </p:cNvPr>
+          <p:cNvPicPr>
+            <a:picLocks noChangeAspect="1"/>
+          </p:cNvPicPr>
+          <p:nvPr/>
+        </p:nvPicPr>
+        <p:blipFill>
+          <a:blip r:embed="rId3">
+            <a:extLst>
+              <a:ext uri="{28A0092B-C50C-407E-A947-70E740481C1C}">
+                <a14:useLocalDpi xmlns:a14="http://schemas.microsoft.com/office/drawing/2010/main" val="0"/>
+              </a:ext>
+            </a:extLst>
+          </a:blip>
+          <a:stretch>
+            <a:fillRect/>
+          </a:stretch>
+        </p:blipFill>
+        <p:spPr>
+          <a:xfrm>
+            <a:off x="243840" y="3992881"/>
+            <a:ext cx="11775440" cy="1621179"/>
+          </a:xfrm>
+          <a:prstGeom prst="rect">
+            <a:avLst/>
+          </a:prstGeom>
+        </p:spPr>
+      </p:pic>
+      <p:sp>
+        <p:nvSpPr>
+          <p:cNvPr id="10" name="Content Placeholder 2">
+            <a:extLst>
+              <a:ext uri="{FF2B5EF4-FFF2-40B4-BE49-F238E27FC236}">
+                <a16:creationId xmlns:a16="http://schemas.microsoft.com/office/drawing/2014/main" id="{2527539B-8835-4254-A1D9-B49FB6B28396}"/>
+              </a:ext>
+            </a:extLst>
+          </p:cNvPr>
+          <p:cNvSpPr txBox="1">
+            <a:spLocks/>
+          </p:cNvSpPr>
+          <p:nvPr/>
+        </p:nvSpPr>
+        <p:spPr>
+          <a:xfrm>
+            <a:off x="1102360" y="5872480"/>
+            <a:ext cx="11653519" cy="497840"/>
+          </a:xfrm>
+          <a:prstGeom prst="rect">
+            <a:avLst/>
+          </a:prstGeom>
+        </p:spPr>
+        <p:txBody>
+          <a:bodyPr vert="horz" lIns="91440" tIns="45720" rIns="91440" bIns="45720" rtlCol="0">
+            <a:normAutofit/>
+          </a:bodyPr>
+          <a:lstStyle>
+            <a:lvl1pPr marL="228600" indent="-228600" algn="l" defTabSz="914400" rtl="0" eaLnBrk="1" latinLnBrk="0" hangingPunct="1">
+              <a:lnSpc>
+                <a:spcPct val="120000"/>
+              </a:lnSpc>
+              <a:spcBef>
+                <a:spcPts val="1000"/>
+              </a:spcBef>
+              <a:buClr>
+                <a:schemeClr val="tx1"/>
+              </a:buClr>
+              <a:buFont typeface="Arial" panose="020B0604020202020204" pitchFamily="34" charset="0"/>
+              <a:buChar char="•"/>
+              <a:defRPr sz="2000" kern="1200" cap="all" baseline="0">
+                <a:solidFill>
+                  <a:schemeClr val="tx1"/>
+                </a:solidFill>
+                <a:effectLst/>
+                <a:latin typeface="+mn-lt"/>
+                <a:ea typeface="+mn-ea"/>
+                <a:cs typeface="+mn-cs"/>
+              </a:defRPr>
+            </a:lvl1pPr>
+            <a:lvl2pPr marL="685800" indent="-228600" algn="l" defTabSz="914400" rtl="0" eaLnBrk="1" latinLnBrk="0" hangingPunct="1">
+              <a:lnSpc>
+                <a:spcPct val="120000"/>
+              </a:lnSpc>
+              <a:spcBef>
+                <a:spcPts val="500"/>
+              </a:spcBef>
+              <a:buClr>
+                <a:schemeClr val="tx1"/>
+              </a:buClr>
+              <a:buFont typeface="Arial" panose="020B0604020202020204" pitchFamily="34" charset="0"/>
+              <a:buChar char="•"/>
+              <a:defRPr sz="1800" kern="1200" cap="all" baseline="0">
+                <a:solidFill>
+                  <a:schemeClr val="tx1"/>
+                </a:solidFill>
+                <a:effectLst/>
+                <a:latin typeface="+mn-lt"/>
+                <a:ea typeface="+mn-ea"/>
+                <a:cs typeface="+mn-cs"/>
+              </a:defRPr>
+            </a:lvl2pPr>
+            <a:lvl3pPr marL="1143000" indent="-228600" algn="l" defTabSz="914400" rtl="0" eaLnBrk="1" latinLnBrk="0" hangingPunct="1">
+              <a:lnSpc>
+                <a:spcPct val="120000"/>
+              </a:lnSpc>
+              <a:spcBef>
+                <a:spcPts val="500"/>
+              </a:spcBef>
+              <a:buClr>
+                <a:schemeClr val="tx1"/>
+              </a:buClr>
+              <a:buFont typeface="Arial" panose="020B0604020202020204" pitchFamily="34" charset="0"/>
+              <a:buChar char="•"/>
+              <a:defRPr sz="1600" kern="1200" cap="all" baseline="0">
+                <a:solidFill>
+                  <a:schemeClr val="tx1"/>
+                </a:solidFill>
+                <a:effectLst/>
+                <a:latin typeface="+mn-lt"/>
+                <a:ea typeface="+mn-ea"/>
+                <a:cs typeface="+mn-cs"/>
+              </a:defRPr>
+            </a:lvl3pPr>
+            <a:lvl4pPr marL="1600200" indent="-228600" algn="l" defTabSz="914400" rtl="0" eaLnBrk="1" latinLnBrk="0" hangingPunct="1">
+              <a:lnSpc>
+                <a:spcPct val="120000"/>
+              </a:lnSpc>
+              <a:spcBef>
+                <a:spcPts val="500"/>
+              </a:spcBef>
+              <a:buClr>
+                <a:schemeClr val="tx1"/>
+              </a:buClr>
+              <a:buFont typeface="Arial" panose="020B0604020202020204" pitchFamily="34" charset="0"/>
+              <a:buChar char="•"/>
+              <a:defRPr sz="1400" kern="1200" cap="all" baseline="0">
+                <a:solidFill>
+                  <a:schemeClr val="tx1"/>
+                </a:solidFill>
+                <a:effectLst/>
+                <a:latin typeface="+mn-lt"/>
+                <a:ea typeface="+mn-ea"/>
+                <a:cs typeface="+mn-cs"/>
+              </a:defRPr>
+            </a:lvl4pPr>
+            <a:lvl5pPr marL="2057400" indent="-228600" algn="l" defTabSz="914400" rtl="0" eaLnBrk="1" latinLnBrk="0" hangingPunct="1">
+              <a:lnSpc>
+                <a:spcPct val="120000"/>
+              </a:lnSpc>
+              <a:spcBef>
+                <a:spcPts val="500"/>
+              </a:spcBef>
+              <a:buClr>
+                <a:schemeClr val="tx1"/>
+              </a:buClr>
+              <a:buFont typeface="Arial" panose="020B0604020202020204" pitchFamily="34" charset="0"/>
+              <a:buChar char="•"/>
+              <a:defRPr sz="1400" kern="1200" cap="all" baseline="0">
+                <a:solidFill>
+                  <a:schemeClr val="tx1"/>
+                </a:solidFill>
+                <a:effectLst/>
+                <a:latin typeface="+mn-lt"/>
+                <a:ea typeface="+mn-ea"/>
+                <a:cs typeface="+mn-cs"/>
+              </a:defRPr>
+            </a:lvl5pPr>
+            <a:lvl6pPr marL="2514600" indent="-228600" algn="l" defTabSz="914400" rtl="0" eaLnBrk="1" latinLnBrk="0" hangingPunct="1">
+              <a:lnSpc>
+                <a:spcPct val="120000"/>
+              </a:lnSpc>
+              <a:spcBef>
+                <a:spcPts val="500"/>
+              </a:spcBef>
+              <a:buClr>
+                <a:schemeClr val="tx1"/>
+              </a:buClr>
+              <a:buFont typeface="Arial" panose="020B0604020202020204" pitchFamily="34" charset="0"/>
+              <a:buChar char="•"/>
+              <a:defRPr sz="1400" kern="1200" cap="all" baseline="0">
+                <a:solidFill>
+                  <a:schemeClr val="tx1"/>
+                </a:solidFill>
+                <a:effectLst/>
+                <a:latin typeface="+mn-lt"/>
+                <a:ea typeface="+mn-ea"/>
+                <a:cs typeface="+mn-cs"/>
+              </a:defRPr>
+            </a:lvl6pPr>
+            <a:lvl7pPr marL="2971800" indent="-228600" algn="l" defTabSz="914400" rtl="0" eaLnBrk="1" latinLnBrk="0" hangingPunct="1">
+              <a:lnSpc>
+                <a:spcPct val="120000"/>
+              </a:lnSpc>
+              <a:spcBef>
+                <a:spcPts val="500"/>
+              </a:spcBef>
+              <a:buClr>
+                <a:schemeClr val="tx1"/>
+              </a:buClr>
+              <a:buFont typeface="Arial" panose="020B0604020202020204" pitchFamily="34" charset="0"/>
+              <a:buChar char="•"/>
+              <a:defRPr sz="1400" kern="1200" cap="all" baseline="0">
+                <a:solidFill>
+                  <a:schemeClr val="tx1"/>
+                </a:solidFill>
+                <a:effectLst/>
+                <a:latin typeface="+mn-lt"/>
+                <a:ea typeface="+mn-ea"/>
+                <a:cs typeface="+mn-cs"/>
+              </a:defRPr>
+            </a:lvl7pPr>
+            <a:lvl8pPr marL="3429000" indent="-228600" algn="l" defTabSz="914400" rtl="0" eaLnBrk="1" latinLnBrk="0" hangingPunct="1">
+              <a:lnSpc>
+                <a:spcPct val="120000"/>
+              </a:lnSpc>
+              <a:spcBef>
+                <a:spcPts val="500"/>
+              </a:spcBef>
+              <a:buClr>
+                <a:schemeClr val="tx1"/>
+              </a:buClr>
+              <a:buFont typeface="Arial" panose="020B0604020202020204" pitchFamily="34" charset="0"/>
+              <a:buChar char="•"/>
+              <a:defRPr sz="1400" kern="1200" cap="all" baseline="0">
+                <a:solidFill>
+                  <a:schemeClr val="tx1"/>
+                </a:solidFill>
+                <a:effectLst/>
+                <a:latin typeface="+mn-lt"/>
+                <a:ea typeface="+mn-ea"/>
+                <a:cs typeface="+mn-cs"/>
+              </a:defRPr>
+            </a:lvl8pPr>
+            <a:lvl9pPr marL="3886200" indent="-228600" algn="l" defTabSz="914400" rtl="0" eaLnBrk="1" latinLnBrk="0" hangingPunct="1">
+              <a:lnSpc>
+                <a:spcPct val="120000"/>
+              </a:lnSpc>
+              <a:spcBef>
+                <a:spcPts val="500"/>
+              </a:spcBef>
+              <a:buClr>
+                <a:schemeClr val="tx1"/>
+              </a:buClr>
+              <a:buFont typeface="Arial" panose="020B0604020202020204" pitchFamily="34" charset="0"/>
+              <a:buChar char="•"/>
+              <a:defRPr sz="1400" kern="1200" cap="all" baseline="0">
+                <a:solidFill>
+                  <a:schemeClr val="tx1"/>
+                </a:solidFill>
+                <a:effectLst/>
+                <a:latin typeface="+mn-lt"/>
+                <a:ea typeface="+mn-ea"/>
+                <a:cs typeface="+mn-cs"/>
+              </a:defRPr>
+            </a:lvl9pPr>
+          </a:lstStyle>
           <a:p>
             <a:pPr marL="0" indent="0">
+              <a:buFont typeface="Arial" panose="020B0604020202020204" pitchFamily="34" charset="0"/>
               <a:buNone/>
             </a:pPr>
-            <a:endParaRPr lang="en-US" dirty="0"/>
+            <a:r>
+              <a:rPr lang="en-US" dirty="0"/>
+              <a:t>Summary Table 1. </a:t>
+            </a:r>
+            <a:r>
+              <a:rPr lang="en-US" dirty="0" err="1"/>
+              <a:t>R_score</a:t>
+            </a:r>
+            <a:r>
+              <a:rPr lang="en-US" dirty="0"/>
+              <a:t>, MSE, MAE with all 20 features vectors</a:t>
+            </a:r>
           </a:p>
         </p:txBody>
       </p:sp>
     </p:spTree>
     <p:extLst>
       <p:ext uri="{BB962C8B-B14F-4D97-AF65-F5344CB8AC3E}">
-        <p14:creationId xmlns:p14="http://schemas.microsoft.com/office/powerpoint/2010/main" val="2682540840"/>
+        <p14:creationId xmlns:p14="http://schemas.microsoft.com/office/powerpoint/2010/main" val="4064074351"/>
       </p:ext>
     </p:extLst>
   </p:cSld>
@@ -6567,6 +6957,226 @@
           <p:cNvPr id="2" name="Title 1">
             <a:extLst>
               <a:ext uri="{FF2B5EF4-FFF2-40B4-BE49-F238E27FC236}">
+                <a16:creationId xmlns:a16="http://schemas.microsoft.com/office/drawing/2014/main" id="{DFB1D296-567C-4495-A533-387DEEB6DE5E}"/>
+              </a:ext>
+            </a:extLst>
+          </p:cNvPr>
+          <p:cNvSpPr>
+            <a:spLocks noGrp="1"/>
+          </p:cNvSpPr>
+          <p:nvPr>
+            <p:ph type="title"/>
+          </p:nvPr>
+        </p:nvSpPr>
+        <p:spPr/>
+        <p:txBody>
+          <a:bodyPr/>
+          <a:lstStyle/>
+          <a:p>
+            <a:endParaRPr lang="en-US" dirty="0"/>
+          </a:p>
+        </p:txBody>
+      </p:sp>
+      <p:sp>
+        <p:nvSpPr>
+          <p:cNvPr id="3" name="Content Placeholder 2">
+            <a:extLst>
+              <a:ext uri="{FF2B5EF4-FFF2-40B4-BE49-F238E27FC236}">
+                <a16:creationId xmlns:a16="http://schemas.microsoft.com/office/drawing/2014/main" id="{4FF1E298-6A4F-4099-99F2-8B64F7206B3F}"/>
+              </a:ext>
+            </a:extLst>
+          </p:cNvPr>
+          <p:cNvSpPr>
+            <a:spLocks noGrp="1"/>
+          </p:cNvSpPr>
+          <p:nvPr>
+            <p:ph idx="1"/>
+          </p:nvPr>
+        </p:nvSpPr>
+        <p:spPr>
+          <a:xfrm>
+            <a:off x="264160" y="2367093"/>
+            <a:ext cx="11826239" cy="1778187"/>
+          </a:xfrm>
+        </p:spPr>
+        <p:txBody>
+          <a:bodyPr>
+            <a:normAutofit/>
+          </a:bodyPr>
+          <a:lstStyle/>
+          <a:p>
+            <a:pPr marL="0" indent="0">
+              <a:buNone/>
+            </a:pPr>
+            <a:r>
+              <a:rPr lang="en-US" sz="6600" dirty="0">
+                <a:latin typeface="Arial" panose="020B0604020202020204" pitchFamily="34" charset="0"/>
+                <a:cs typeface="Arial" panose="020B0604020202020204" pitchFamily="34" charset="0"/>
+              </a:rPr>
+              <a:t>If we had more time </a:t>
+            </a:r>
+          </a:p>
+        </p:txBody>
+      </p:sp>
+    </p:spTree>
+    <p:extLst>
+      <p:ext uri="{BB962C8B-B14F-4D97-AF65-F5344CB8AC3E}">
+        <p14:creationId xmlns:p14="http://schemas.microsoft.com/office/powerpoint/2010/main" val="826753844"/>
+      </p:ext>
+    </p:extLst>
+  </p:cSld>
+  <p:clrMapOvr>
+    <a:masterClrMapping/>
+  </p:clrMapOvr>
+</p:sld>
+</file>
+
+<file path=ppt/slides/slide4.xml><?xml version="1.0" encoding="utf-8"?>
+<p:sld xmlns:a="http://schemas.openxmlformats.org/drawingml/2006/main" xmlns:r="http://schemas.openxmlformats.org/officeDocument/2006/relationships" xmlns:p="http://schemas.openxmlformats.org/presentationml/2006/main">
+  <p:cSld>
+    <p:spTree>
+      <p:nvGrpSpPr>
+        <p:cNvPr id="1" name=""/>
+        <p:cNvGrpSpPr/>
+        <p:nvPr/>
+      </p:nvGrpSpPr>
+      <p:grpSpPr>
+        <a:xfrm>
+          <a:off x="0" y="0"/>
+          <a:ext cx="0" cy="0"/>
+          <a:chOff x="0" y="0"/>
+          <a:chExt cx="0" cy="0"/>
+        </a:xfrm>
+      </p:grpSpPr>
+      <p:sp>
+        <p:nvSpPr>
+          <p:cNvPr id="2" name="Title 1">
+            <a:extLst>
+              <a:ext uri="{FF2B5EF4-FFF2-40B4-BE49-F238E27FC236}">
+                <a16:creationId xmlns:a16="http://schemas.microsoft.com/office/drawing/2014/main" id="{E55FC3AB-09FE-447A-8E97-B349B7CBA6F0}"/>
+              </a:ext>
+            </a:extLst>
+          </p:cNvPr>
+          <p:cNvSpPr>
+            <a:spLocks noGrp="1"/>
+          </p:cNvSpPr>
+          <p:nvPr>
+            <p:ph type="title"/>
+          </p:nvPr>
+        </p:nvSpPr>
+        <p:spPr>
+          <a:xfrm>
+            <a:off x="913774" y="161926"/>
+            <a:ext cx="10364451" cy="552449"/>
+          </a:xfrm>
+        </p:spPr>
+        <p:txBody>
+          <a:bodyPr>
+            <a:normAutofit fontScale="90000"/>
+          </a:bodyPr>
+          <a:lstStyle/>
+          <a:p>
+            <a:r>
+              <a:rPr lang="en-US" dirty="0"/>
+              <a:t>If we have more time</a:t>
+            </a:r>
+          </a:p>
+        </p:txBody>
+      </p:sp>
+      <p:sp>
+        <p:nvSpPr>
+          <p:cNvPr id="3" name="Content Placeholder 2">
+            <a:extLst>
+              <a:ext uri="{FF2B5EF4-FFF2-40B4-BE49-F238E27FC236}">
+                <a16:creationId xmlns:a16="http://schemas.microsoft.com/office/drawing/2014/main" id="{3248396E-724D-4D5D-8AA1-25F4E050B330}"/>
+              </a:ext>
+            </a:extLst>
+          </p:cNvPr>
+          <p:cNvSpPr>
+            <a:spLocks noGrp="1"/>
+          </p:cNvSpPr>
+          <p:nvPr>
+            <p:ph idx="1"/>
+          </p:nvPr>
+        </p:nvSpPr>
+        <p:spPr>
+          <a:xfrm>
+            <a:off x="219074" y="971551"/>
+            <a:ext cx="11725275" cy="5572124"/>
+          </a:xfrm>
+        </p:spPr>
+        <p:txBody>
+          <a:bodyPr/>
+          <a:lstStyle/>
+          <a:p>
+            <a:pPr marL="0" indent="0">
+              <a:buNone/>
+            </a:pPr>
+            <a:r>
+              <a:rPr lang="en-US" sz="6000" dirty="0"/>
+              <a:t>Creating an ensemble learners</a:t>
+            </a:r>
+            <a:endParaRPr lang="en-US" i="1" dirty="0"/>
+          </a:p>
+          <a:p>
+            <a:r>
+              <a:rPr lang="en-US" i="1" dirty="0"/>
+              <a:t>Ensemble models in machine learning combine the decisions from multiple models to improve the overall performance.</a:t>
+            </a:r>
+            <a:r>
+              <a:rPr lang="en-US" dirty="0"/>
+              <a:t> </a:t>
+            </a:r>
+          </a:p>
+          <a:p>
+            <a:r>
+              <a:rPr lang="en-US" dirty="0"/>
+              <a:t>Make the learner we have got better</a:t>
+            </a:r>
+          </a:p>
+          <a:p>
+            <a:pPr marL="0" indent="0">
+              <a:buNone/>
+            </a:pPr>
+            <a:endParaRPr lang="en-US" dirty="0"/>
+          </a:p>
+        </p:txBody>
+      </p:sp>
+    </p:spTree>
+    <p:extLst>
+      <p:ext uri="{BB962C8B-B14F-4D97-AF65-F5344CB8AC3E}">
+        <p14:creationId xmlns:p14="http://schemas.microsoft.com/office/powerpoint/2010/main" val="2682540840"/>
+      </p:ext>
+    </p:extLst>
+  </p:cSld>
+  <p:clrMapOvr>
+    <a:masterClrMapping/>
+  </p:clrMapOvr>
+</p:sld>
+</file>
+
+<file path=ppt/slides/slide5.xml><?xml version="1.0" encoding="utf-8"?>
+<p:sld xmlns:a="http://schemas.openxmlformats.org/drawingml/2006/main" xmlns:r="http://schemas.openxmlformats.org/officeDocument/2006/relationships" xmlns:p="http://schemas.openxmlformats.org/presentationml/2006/main">
+  <p:cSld>
+    <p:spTree>
+      <p:nvGrpSpPr>
+        <p:cNvPr id="1" name=""/>
+        <p:cNvGrpSpPr/>
+        <p:nvPr/>
+      </p:nvGrpSpPr>
+      <p:grpSpPr>
+        <a:xfrm>
+          <a:off x="0" y="0"/>
+          <a:ext cx="0" cy="0"/>
+          <a:chOff x="0" y="0"/>
+          <a:chExt cx="0" cy="0"/>
+        </a:xfrm>
+      </p:grpSpPr>
+      <p:sp>
+        <p:nvSpPr>
+          <p:cNvPr id="2" name="Title 1">
+            <a:extLst>
+              <a:ext uri="{FF2B5EF4-FFF2-40B4-BE49-F238E27FC236}">
                 <a16:creationId xmlns:a16="http://schemas.microsoft.com/office/drawing/2014/main" id="{7F2B70AC-275B-407B-9F73-9306C0982313}"/>
               </a:ext>
             </a:extLst>
@@ -6699,7 +7309,7 @@
 </p:sld>
 </file>
 
-<file path=ppt/slides/slide4.xml><?xml version="1.0" encoding="utf-8"?>
+<file path=ppt/slides/slide6.xml><?xml version="1.0" encoding="utf-8"?>
 <p:sld xmlns:a="http://schemas.openxmlformats.org/drawingml/2006/main" xmlns:r="http://schemas.openxmlformats.org/officeDocument/2006/relationships" xmlns:p="http://schemas.openxmlformats.org/presentationml/2006/main">
   <p:cSld>
     <p:spTree>
@@ -6880,7 +7490,7 @@
 </p:sld>
 </file>
 
-<file path=ppt/slides/slide5.xml><?xml version="1.0" encoding="utf-8"?>
+<file path=ppt/slides/slide7.xml><?xml version="1.0" encoding="utf-8"?>
 <p:sld xmlns:a="http://schemas.openxmlformats.org/drawingml/2006/main" xmlns:r="http://schemas.openxmlformats.org/officeDocument/2006/relationships" xmlns:p="http://schemas.openxmlformats.org/presentationml/2006/main">
   <p:cSld>
     <p:spTree>

</xml_diff>

<commit_message>
upload updated ipynb and Output csv files
</commit_message>
<xml_diff>
--- a/flu_indicator/data/resources/Presentation1.pptx
+++ b/flu_indicator/data/resources/Presentation1.pptx
@@ -289,7 +289,7 @@
           <a:p>
             <a:fld id="{A1859F04-D51F-4ABC-AD89-DF326765EE81}" type="datetimeFigureOut">
               <a:rPr lang="en-US" smtClean="0"/>
-              <a:t>8/6/2019</a:t>
+              <a:t>8/7/2019</a:t>
             </a:fld>
             <a:endParaRPr lang="en-US"/>
           </a:p>
@@ -604,7 +604,7 @@
           <a:p>
             <a:fld id="{A1859F04-D51F-4ABC-AD89-DF326765EE81}" type="datetimeFigureOut">
               <a:rPr lang="en-US" smtClean="0"/>
-              <a:t>8/6/2019</a:t>
+              <a:t>8/7/2019</a:t>
             </a:fld>
             <a:endParaRPr lang="en-US"/>
           </a:p>
@@ -826,7 +826,7 @@
           <a:p>
             <a:fld id="{A1859F04-D51F-4ABC-AD89-DF326765EE81}" type="datetimeFigureOut">
               <a:rPr lang="en-US" smtClean="0"/>
-              <a:t>8/6/2019</a:t>
+              <a:t>8/7/2019</a:t>
             </a:fld>
             <a:endParaRPr lang="en-US"/>
           </a:p>
@@ -1117,7 +1117,7 @@
           <a:p>
             <a:fld id="{A1859F04-D51F-4ABC-AD89-DF326765EE81}" type="datetimeFigureOut">
               <a:rPr lang="en-US" smtClean="0"/>
-              <a:t>8/6/2019</a:t>
+              <a:t>8/7/2019</a:t>
             </a:fld>
             <a:endParaRPr lang="en-US"/>
           </a:p>
@@ -1571,7 +1571,7 @@
           <a:p>
             <a:fld id="{A1859F04-D51F-4ABC-AD89-DF326765EE81}" type="datetimeFigureOut">
               <a:rPr lang="en-US" smtClean="0"/>
-              <a:t>8/6/2019</a:t>
+              <a:t>8/7/2019</a:t>
             </a:fld>
             <a:endParaRPr lang="en-US"/>
           </a:p>
@@ -2147,7 +2147,7 @@
           <a:p>
             <a:fld id="{A1859F04-D51F-4ABC-AD89-DF326765EE81}" type="datetimeFigureOut">
               <a:rPr lang="en-US" smtClean="0"/>
-              <a:t>8/6/2019</a:t>
+              <a:t>8/7/2019</a:t>
             </a:fld>
             <a:endParaRPr lang="en-US"/>
           </a:p>
@@ -3008,7 +3008,7 @@
           <a:p>
             <a:fld id="{A1859F04-D51F-4ABC-AD89-DF326765EE81}" type="datetimeFigureOut">
               <a:rPr lang="en-US" smtClean="0"/>
-              <a:t>8/6/2019</a:t>
+              <a:t>8/7/2019</a:t>
             </a:fld>
             <a:endParaRPr lang="en-US"/>
           </a:p>
@@ -3213,7 +3213,7 @@
           <a:p>
             <a:fld id="{A1859F04-D51F-4ABC-AD89-DF326765EE81}" type="datetimeFigureOut">
               <a:rPr lang="en-US" smtClean="0"/>
-              <a:t>8/6/2019</a:t>
+              <a:t>8/7/2019</a:t>
             </a:fld>
             <a:endParaRPr lang="en-US"/>
           </a:p>
@@ -3427,7 +3427,7 @@
           <a:p>
             <a:fld id="{A1859F04-D51F-4ABC-AD89-DF326765EE81}" type="datetimeFigureOut">
               <a:rPr lang="en-US" smtClean="0"/>
-              <a:t>8/6/2019</a:t>
+              <a:t>8/7/2019</a:t>
             </a:fld>
             <a:endParaRPr lang="en-US"/>
           </a:p>
@@ -3597,7 +3597,7 @@
           <a:p>
             <a:fld id="{A1859F04-D51F-4ABC-AD89-DF326765EE81}" type="datetimeFigureOut">
               <a:rPr lang="en-US" smtClean="0"/>
-              <a:t>8/6/2019</a:t>
+              <a:t>8/7/2019</a:t>
             </a:fld>
             <a:endParaRPr lang="en-US"/>
           </a:p>
@@ -3802,7 +3802,7 @@
           <a:p>
             <a:fld id="{A1859F04-D51F-4ABC-AD89-DF326765EE81}" type="datetimeFigureOut">
               <a:rPr lang="en-US" smtClean="0"/>
-              <a:t>8/6/2019</a:t>
+              <a:t>8/7/2019</a:t>
             </a:fld>
             <a:endParaRPr lang="en-US"/>
           </a:p>
@@ -4082,7 +4082,7 @@
           <a:p>
             <a:fld id="{A1859F04-D51F-4ABC-AD89-DF326765EE81}" type="datetimeFigureOut">
               <a:rPr lang="en-US" smtClean="0"/>
-              <a:t>8/6/2019</a:t>
+              <a:t>8/7/2019</a:t>
             </a:fld>
             <a:endParaRPr lang="en-US"/>
           </a:p>
@@ -4349,7 +4349,7 @@
           <a:p>
             <a:fld id="{A1859F04-D51F-4ABC-AD89-DF326765EE81}" type="datetimeFigureOut">
               <a:rPr lang="en-US" smtClean="0"/>
-              <a:t>8/6/2019</a:t>
+              <a:t>8/7/2019</a:t>
             </a:fld>
             <a:endParaRPr lang="en-US"/>
           </a:p>
@@ -4764,7 +4764,7 @@
           <a:p>
             <a:fld id="{A1859F04-D51F-4ABC-AD89-DF326765EE81}" type="datetimeFigureOut">
               <a:rPr lang="en-US" smtClean="0"/>
-              <a:t>8/6/2019</a:t>
+              <a:t>8/7/2019</a:t>
             </a:fld>
             <a:endParaRPr lang="en-US"/>
           </a:p>
@@ -4912,7 +4912,7 @@
           <a:p>
             <a:fld id="{A1859F04-D51F-4ABC-AD89-DF326765EE81}" type="datetimeFigureOut">
               <a:rPr lang="en-US" smtClean="0"/>
-              <a:t>8/6/2019</a:t>
+              <a:t>8/7/2019</a:t>
             </a:fld>
             <a:endParaRPr lang="en-US"/>
           </a:p>
@@ -5037,7 +5037,7 @@
           <a:p>
             <a:fld id="{A1859F04-D51F-4ABC-AD89-DF326765EE81}" type="datetimeFigureOut">
               <a:rPr lang="en-US" smtClean="0"/>
-              <a:t>8/6/2019</a:t>
+              <a:t>8/7/2019</a:t>
             </a:fld>
             <a:endParaRPr lang="en-US"/>
           </a:p>
@@ -5316,7 +5316,7 @@
           <a:p>
             <a:fld id="{A1859F04-D51F-4ABC-AD89-DF326765EE81}" type="datetimeFigureOut">
               <a:rPr lang="en-US" smtClean="0"/>
-              <a:t>8/6/2019</a:t>
+              <a:t>8/7/2019</a:t>
             </a:fld>
             <a:endParaRPr lang="en-US"/>
           </a:p>
@@ -5631,7 +5631,7 @@
           <a:p>
             <a:fld id="{A1859F04-D51F-4ABC-AD89-DF326765EE81}" type="datetimeFigureOut">
               <a:rPr lang="en-US" smtClean="0"/>
-              <a:t>8/6/2019</a:t>
+              <a:t>8/7/2019</a:t>
             </a:fld>
             <a:endParaRPr lang="en-US"/>
           </a:p>
@@ -5884,7 +5884,7 @@
           <a:p>
             <a:fld id="{A1859F04-D51F-4ABC-AD89-DF326765EE81}" type="datetimeFigureOut">
               <a:rPr lang="en-US" smtClean="0"/>
-              <a:t>8/6/2019</a:t>
+              <a:t>8/7/2019</a:t>
             </a:fld>
             <a:endParaRPr lang="en-US"/>
           </a:p>
@@ -6590,7 +6590,7 @@
             </a:pPr>
             <a:r>
               <a:rPr lang="en-US" dirty="0"/>
-              <a:t>Summary Table 1. </a:t>
+              <a:t>Summary Table 2. </a:t>
             </a:r>
             <a:r>
               <a:rPr lang="en-US" dirty="0" err="1"/>
@@ -6909,7 +6909,7 @@
             </a:pPr>
             <a:r>
               <a:rPr lang="en-US" dirty="0"/>
-              <a:t>Summary Table 1. </a:t>
+              <a:t>Summary Table 3. </a:t>
             </a:r>
             <a:r>
               <a:rPr lang="en-US" dirty="0" err="1"/>

</xml_diff>